<commit_message>
Fixes for sorting and searching algorithms slides
</commit_message>
<xml_diff>
--- a/Courses/Software-Sciences/Module-2-DS-and-Algo/14-Sorting-and-Searching-Algorithms/14-Sorting-and-Searching-Algorithms.pptx
+++ b/Courses/Software-Sciences/Module-2-DS-and-Algo/14-Sorting-and-Searching-Algorithms/14-Sorting-and-Searching-Algorithms.pptx
@@ -327,7 +327,7 @@
           <a:p>
             <a:fld id="{4E087215-0C8F-4762-A664-737A353EC9A4}" type="datetimeFigureOut">
               <a:rPr lang="bg-BG" smtClean="0"/>
-              <a:t>6.04.23 г.</a:t>
+              <a:t>29.08.23 г.</a:t>
             </a:fld>
             <a:endParaRPr lang="bg-BG" dirty="0"/>
           </a:p>
@@ -518,7 +518,7 @@
           <a:p>
             <a:fld id="{72D84649-876A-46C9-8472-14CB09C070D8}" type="datetimeFigureOut">
               <a:rPr lang="en-US" smtClean="0"/>
-              <a:t>4/6/23</a:t>
+              <a:t>8/29/23</a:t>
             </a:fld>
             <a:endParaRPr lang="en-US" dirty="0"/>
           </a:p>
@@ -9129,11 +9129,19 @@
             </a:r>
             <a:r>
               <a:rPr lang="en-US" dirty="0"/>
-              <a:t>Swap:</a:t>
+              <a:t>Swap –</a:t>
             </a:r>
             <a:r>
               <a:rPr lang="bg-BG" dirty="0"/>
-              <a:t> код</a:t>
+              <a:t> </a:t>
+            </a:r>
+            <a:r>
+              <a:rPr lang="en-US" dirty="0"/>
+              <a:t>K</a:t>
+            </a:r>
+            <a:r>
+              <a:rPr lang="bg-BG" dirty="0"/>
+              <a:t>од</a:t>
             </a:r>
             <a:endParaRPr lang="en-US" dirty="0"/>
           </a:p>
@@ -9599,8 +9607,8 @@
         </p:nvSpPr>
         <p:spPr>
           <a:xfrm>
-            <a:off x="1552184" y="898855"/>
-            <a:ext cx="7018816" cy="5545145"/>
+            <a:off x="1866000" y="864000"/>
+            <a:ext cx="6867116" cy="5546589"/>
           </a:xfrm>
         </p:spPr>
         <p:txBody>
@@ -9639,7 +9647,19 @@
             </a:r>
             <a:r>
               <a:rPr lang="bg-BG" sz="2900" dirty="0"/>
-              <a:t>но неефективен алгоритъм</a:t>
+              <a:t>но </a:t>
+            </a:r>
+            <a:r>
+              <a:rPr lang="bg-BG" sz="2900" b="1" dirty="0">
+                <a:solidFill>
+                  <a:schemeClr val="bg1"/>
+                </a:solidFill>
+              </a:rPr>
+              <a:t>неефективен</a:t>
+            </a:r>
+            <a:r>
+              <a:rPr lang="bg-BG" sz="2900" dirty="0"/>
+              <a:t> алгоритъм</a:t>
             </a:r>
             <a:endParaRPr lang="en-US" sz="2900" dirty="0"/>
           </a:p>
@@ -9791,10 +9811,18 @@
               <a:t>: </a:t>
             </a:r>
             <a:r>
-              <a:rPr lang="bg-BG" sz="2900" dirty="0"/>
+              <a:rPr lang="bg-BG" sz="2900" b="1" dirty="0">
+                <a:solidFill>
+                  <a:schemeClr val="bg1"/>
+                </a:solidFill>
+              </a:rPr>
               <a:t>Размяна</a:t>
             </a:r>
-            <a:endParaRPr lang="en-US" sz="2900" dirty="0"/>
+            <a:endParaRPr lang="en-US" sz="2900" b="1" dirty="0">
+              <a:solidFill>
+                <a:schemeClr val="bg1"/>
+              </a:solidFill>
+            </a:endParaRPr>
           </a:p>
           <a:p>
             <a:pPr lvl="1">
@@ -9958,7 +9986,7 @@
         </p:blipFill>
         <p:spPr bwMode="auto">
           <a:xfrm>
-            <a:off x="8733116" y="1039745"/>
+            <a:off x="8751000" y="1039745"/>
             <a:ext cx="3215163" cy="4311749"/>
           </a:xfrm>
           <a:prstGeom prst="rect">
@@ -10429,11 +10457,19 @@
             </a:r>
             <a:r>
               <a:rPr lang="en-US" dirty="0"/>
-              <a:t>Sort</a:t>
+              <a:t>Sort –</a:t>
             </a:r>
             <a:r>
               <a:rPr lang="bg-BG" dirty="0"/>
-              <a:t>: код</a:t>
+              <a:t> </a:t>
+            </a:r>
+            <a:r>
+              <a:rPr lang="en-US" dirty="0"/>
+              <a:t>K</a:t>
+            </a:r>
+            <a:r>
+              <a:rPr lang="bg-BG" dirty="0"/>
+              <a:t>од</a:t>
             </a:r>
             <a:endParaRPr lang="en-US" dirty="0"/>
           </a:p>
@@ -11234,9 +11270,21 @@
             </a:r>
             <a:r>
               <a:rPr lang="bg-BG" sz="3399" dirty="0"/>
-              <a:t>но неефективен</a:t>
-            </a:r>
-            <a:endParaRPr lang="en-US" sz="3399" dirty="0"/>
+              <a:t>но </a:t>
+            </a:r>
+            <a:r>
+              <a:rPr lang="bg-BG" sz="3399" b="1" dirty="0">
+                <a:solidFill>
+                  <a:schemeClr val="bg1"/>
+                </a:solidFill>
+              </a:rPr>
+              <a:t>неефективен</a:t>
+            </a:r>
+            <a:endParaRPr lang="en-US" sz="3399" b="1" dirty="0">
+              <a:solidFill>
+                <a:schemeClr val="bg1"/>
+              </a:solidFill>
+            </a:endParaRPr>
           </a:p>
           <a:p>
             <a:pPr lvl="1"/>
@@ -11665,7 +11713,7 @@
                                         <p:tgtEl>
                                           <p:spTgt spid="3">
                                             <p:txEl>
-                                              <p:pRg st="1" end="1"/>
+                                              <p:pRg st="2" end="2"/>
                                             </p:txEl>
                                           </p:spTgt>
                                         </p:tgtEl>
@@ -11714,7 +11762,7 @@
                                         <p:tgtEl>
                                           <p:spTgt spid="3">
                                             <p:txEl>
-                                              <p:pRg st="2" end="2"/>
+                                              <p:pRg st="3" end="3"/>
                                             </p:txEl>
                                           </p:spTgt>
                                         </p:tgtEl>
@@ -11763,55 +11811,6 @@
                                         <p:tgtEl>
                                           <p:spTgt spid="3">
                                             <p:txEl>
-                                              <p:pRg st="3" end="3"/>
-                                            </p:txEl>
-                                          </p:spTgt>
-                                        </p:tgtEl>
-                                        <p:attrNameLst>
-                                          <p:attrName>style.visibility</p:attrName>
-                                        </p:attrNameLst>
-                                      </p:cBhvr>
-                                      <p:to>
-                                        <p:strVal val="visible"/>
-                                      </p:to>
-                                    </p:set>
-                                  </p:childTnLst>
-                                </p:cTn>
-                              </p:par>
-                            </p:childTnLst>
-                          </p:cTn>
-                        </p:par>
-                      </p:childTnLst>
-                    </p:cTn>
-                  </p:par>
-                  <p:par>
-                    <p:cTn id="15" fill="hold">
-                      <p:stCondLst>
-                        <p:cond delay="indefinite"/>
-                      </p:stCondLst>
-                      <p:childTnLst>
-                        <p:par>
-                          <p:cTn id="16" fill="hold">
-                            <p:stCondLst>
-                              <p:cond delay="0"/>
-                            </p:stCondLst>
-                            <p:childTnLst>
-                              <p:par>
-                                <p:cTn id="17" presetID="1" presetClass="entr" presetSubtype="0" fill="hold" nodeType="clickEffect">
-                                  <p:stCondLst>
-                                    <p:cond delay="0"/>
-                                  </p:stCondLst>
-                                  <p:childTnLst>
-                                    <p:set>
-                                      <p:cBhvr>
-                                        <p:cTn id="18" dur="1" fill="hold">
-                                          <p:stCondLst>
-                                            <p:cond delay="0"/>
-                                          </p:stCondLst>
-                                        </p:cTn>
-                                        <p:tgtEl>
-                                          <p:spTgt spid="3">
-                                            <p:txEl>
                                               <p:pRg st="4" end="4"/>
                                             </p:txEl>
                                           </p:spTgt>
@@ -11828,14 +11827,14 @@
                                 </p:cTn>
                               </p:par>
                               <p:par>
-                                <p:cTn id="19" presetID="1" presetClass="entr" presetSubtype="0" fill="hold" nodeType="withEffect">
+                                <p:cTn id="15" presetID="1" presetClass="entr" presetSubtype="0" fill="hold" nodeType="withEffect">
                                   <p:stCondLst>
                                     <p:cond delay="0"/>
                                   </p:stCondLst>
                                   <p:childTnLst>
                                     <p:set>
                                       <p:cBhvr>
-                                        <p:cTn id="20" dur="1" fill="hold">
+                                        <p:cTn id="16" dur="1" fill="hold">
                                           <p:stCondLst>
                                             <p:cond delay="0"/>
                                           </p:stCondLst>
@@ -11919,11 +11918,19 @@
           <a:p>
             <a:r>
               <a:rPr lang="en-US" dirty="0"/>
-              <a:t>Insertion</a:t>
+              <a:t>Insertion –</a:t>
             </a:r>
             <a:r>
               <a:rPr lang="bg-BG" dirty="0"/>
-              <a:t>: код</a:t>
+              <a:t> </a:t>
+            </a:r>
+            <a:r>
+              <a:rPr lang="en-US" dirty="0"/>
+              <a:t>K</a:t>
+            </a:r>
+            <a:r>
+              <a:rPr lang="bg-BG" dirty="0"/>
+              <a:t>од</a:t>
             </a:r>
             <a:endParaRPr lang="en-US" dirty="0"/>
           </a:p>
@@ -12611,11 +12618,7 @@
             </a:r>
             <a:r>
               <a:rPr lang="en-US" dirty="0"/>
-              <a:t> </a:t>
-            </a:r>
-            <a:r>
-              <a:rPr lang="en-US" dirty="0" err="1"/>
-              <a:t>MergeSort</a:t>
+              <a:t> MergeSort</a:t>
             </a:r>
             <a:endParaRPr lang="en-BG" dirty="0"/>
           </a:p>
@@ -12761,8 +12764,16 @@
               <a:t> – </a:t>
             </a:r>
             <a:r>
+              <a:rPr lang="bg-BG" sz="3150" b="1" dirty="0">
+                <a:solidFill>
+                  <a:schemeClr val="bg1"/>
+                </a:solidFill>
+              </a:rPr>
+              <a:t>ефективен</a:t>
+            </a:r>
+            <a:r>
               <a:rPr lang="bg-BG" sz="3150" dirty="0"/>
-              <a:t>ефективен сортиращ алгоритъм</a:t>
+              <a:t> сортиращ алгоритъм</a:t>
             </a:r>
             <a:endParaRPr lang="en-US" sz="3150" dirty="0"/>
           </a:p>
@@ -12774,23 +12785,7 @@
             </a:pPr>
             <a:r>
               <a:rPr lang="bg-BG" sz="3150" dirty="0"/>
-              <a:t>Избира </a:t>
-            </a:r>
-            <a:r>
-              <a:rPr lang="bg-BG" sz="3150" b="1" dirty="0">
-                <a:solidFill>
-                  <a:schemeClr val="bg1"/>
-                </a:solidFill>
-              </a:rPr>
-              <a:t>пивот</a:t>
-            </a:r>
-            <a:r>
-              <a:rPr lang="en-US" sz="3150" dirty="0"/>
-              <a:t>; </a:t>
-            </a:r>
-            <a:r>
-              <a:rPr lang="bg-BG" sz="3150" dirty="0"/>
-              <a:t>премества </a:t>
+              <a:t>Премества </a:t>
             </a:r>
             <a:r>
               <a:rPr lang="bg-BG" sz="3150" b="1" dirty="0">
@@ -13278,7 +13273,7 @@
                                         <p:tgtEl>
                                           <p:spTgt spid="3">
                                             <p:txEl>
-                                              <p:pRg st="1" end="1"/>
+                                              <p:pRg st="2" end="2"/>
                                             </p:txEl>
                                           </p:spTgt>
                                         </p:tgtEl>
@@ -13327,7 +13322,7 @@
                                         <p:tgtEl>
                                           <p:spTgt spid="3">
                                             <p:txEl>
-                                              <p:pRg st="2" end="2"/>
+                                              <p:pRg st="3" end="3"/>
                                             </p:txEl>
                                           </p:spTgt>
                                         </p:tgtEl>
@@ -13376,55 +13371,6 @@
                                         <p:tgtEl>
                                           <p:spTgt spid="3">
                                             <p:txEl>
-                                              <p:pRg st="3" end="3"/>
-                                            </p:txEl>
-                                          </p:spTgt>
-                                        </p:tgtEl>
-                                        <p:attrNameLst>
-                                          <p:attrName>style.visibility</p:attrName>
-                                        </p:attrNameLst>
-                                      </p:cBhvr>
-                                      <p:to>
-                                        <p:strVal val="visible"/>
-                                      </p:to>
-                                    </p:set>
-                                  </p:childTnLst>
-                                </p:cTn>
-                              </p:par>
-                            </p:childTnLst>
-                          </p:cTn>
-                        </p:par>
-                      </p:childTnLst>
-                    </p:cTn>
-                  </p:par>
-                  <p:par>
-                    <p:cTn id="15" fill="hold">
-                      <p:stCondLst>
-                        <p:cond delay="indefinite"/>
-                      </p:stCondLst>
-                      <p:childTnLst>
-                        <p:par>
-                          <p:cTn id="16" fill="hold">
-                            <p:stCondLst>
-                              <p:cond delay="0"/>
-                            </p:stCondLst>
-                            <p:childTnLst>
-                              <p:par>
-                                <p:cTn id="17" presetID="1" presetClass="entr" presetSubtype="0" fill="hold" nodeType="clickEffect">
-                                  <p:stCondLst>
-                                    <p:cond delay="0"/>
-                                  </p:stCondLst>
-                                  <p:childTnLst>
-                                    <p:set>
-                                      <p:cBhvr>
-                                        <p:cTn id="18" dur="1" fill="hold">
-                                          <p:stCondLst>
-                                            <p:cond delay="0"/>
-                                          </p:stCondLst>
-                                        </p:cTn>
-                                        <p:tgtEl>
-                                          <p:spTgt spid="3">
-                                            <p:txEl>
                                               <p:pRg st="4" end="4"/>
                                             </p:txEl>
                                           </p:spTgt>
@@ -13441,14 +13387,14 @@
                                 </p:cTn>
                               </p:par>
                               <p:par>
-                                <p:cTn id="19" presetID="1" presetClass="entr" presetSubtype="0" fill="hold" nodeType="withEffect">
+                                <p:cTn id="15" presetID="1" presetClass="entr" presetSubtype="0" fill="hold" nodeType="withEffect">
                                   <p:stCondLst>
                                     <p:cond delay="0"/>
                                   </p:stCondLst>
                                   <p:childTnLst>
                                     <p:set>
                                       <p:cBhvr>
-                                        <p:cTn id="20" dur="1" fill="hold">
+                                        <p:cTn id="16" dur="1" fill="hold">
                                           <p:stCondLst>
                                             <p:cond delay="0"/>
                                           </p:stCondLst>
@@ -13782,13 +13728,13 @@
         </p:nvSpPr>
         <p:spPr>
           <a:xfrm>
-            <a:off x="1912090" y="962819"/>
-            <a:ext cx="9942410" cy="5545145"/>
+            <a:off x="1821000" y="962819"/>
+            <a:ext cx="10299444" cy="5545145"/>
           </a:xfrm>
         </p:spPr>
         <p:txBody>
           <a:bodyPr>
-            <a:normAutofit fontScale="85000" lnSpcReduction="20000"/>
+            <a:normAutofit fontScale="92500" lnSpcReduction="20000"/>
           </a:bodyPr>
           <a:lstStyle/>
           <a:p>
@@ -13807,7 +13753,19 @@
             </a:r>
             <a:r>
               <a:rPr lang="bg-BG" sz="3499" dirty="0"/>
-              <a:t>ефективен сортиращ алгоритъм</a:t>
+              <a:t>–</a:t>
+            </a:r>
+            <a:r>
+              <a:rPr lang="bg-BG" sz="3499" b="1" dirty="0">
+                <a:solidFill>
+                  <a:schemeClr val="bg1"/>
+                </a:solidFill>
+              </a:rPr>
+              <a:t> ефективен</a:t>
+            </a:r>
+            <a:r>
+              <a:rPr lang="bg-BG" sz="3499" dirty="0"/>
+              <a:t> сортиращ алгоритъм</a:t>
             </a:r>
             <a:endParaRPr lang="en-US" sz="3499" dirty="0"/>
           </a:p>
@@ -13888,7 +13846,15 @@
             </a:r>
             <a:r>
               <a:rPr lang="en-US" dirty="0"/>
-              <a:t>merge-sort)</a:t>
+              <a:t>merg</a:t>
+            </a:r>
+            <a:r>
+              <a:rPr lang="bg-BG" dirty="0"/>
+              <a:t>е </a:t>
+            </a:r>
+            <a:r>
+              <a:rPr lang="en-US" dirty="0"/>
+              <a:t>sort)</a:t>
             </a:r>
           </a:p>
           <a:p>
@@ -13991,34 +13957,6 @@
                 <a:schemeClr val="bg1"/>
               </a:solidFill>
             </a:endParaRPr>
-          </a:p>
-          <a:p>
-            <a:r>
-              <a:rPr lang="ru-RU" sz="3499" dirty="0"/>
-              <a:t>Висока паралелизуемост на няколко ядра </a:t>
-            </a:r>
-            <a:r>
-              <a:rPr lang="en-US" sz="3499" dirty="0">
-                <a:sym typeface="Wingdings" panose="05000000000000000000" pitchFamily="2" charset="2"/>
-              </a:rPr>
-              <a:t> </a:t>
-            </a:r>
-            <a:r>
-              <a:rPr lang="bg-BG" sz="3499" dirty="0"/>
-              <a:t>до</a:t>
-            </a:r>
-            <a:r>
-              <a:rPr lang="en-US" sz="3499" dirty="0"/>
-              <a:t> </a:t>
-            </a:r>
-            <a:r>
-              <a:rPr lang="en-US" sz="3499" b="1" dirty="0">
-                <a:solidFill>
-                  <a:schemeClr val="bg1"/>
-                </a:solidFill>
-              </a:rPr>
-              <a:t>O(log(n))</a:t>
-            </a:r>
           </a:p>
           <a:p>
             <a:r>
@@ -14534,64 +14472,15 @@
                                   </p:childTnLst>
                                 </p:cTn>
                               </p:par>
-                            </p:childTnLst>
-                          </p:cTn>
-                        </p:par>
-                      </p:childTnLst>
-                    </p:cTn>
-                  </p:par>
-                  <p:par>
-                    <p:cTn id="23" fill="hold">
-                      <p:stCondLst>
-                        <p:cond delay="indefinite"/>
-                      </p:stCondLst>
-                      <p:childTnLst>
-                        <p:par>
-                          <p:cTn id="24" fill="hold">
-                            <p:stCondLst>
-                              <p:cond delay="0"/>
-                            </p:stCondLst>
-                            <p:childTnLst>
                               <p:par>
-                                <p:cTn id="25" presetID="1" presetClass="entr" presetSubtype="0" fill="hold" nodeType="clickEffect">
+                                <p:cTn id="23" presetID="1" presetClass="entr" presetSubtype="0" fill="hold" nodeType="withEffect">
                                   <p:stCondLst>
                                     <p:cond delay="0"/>
                                   </p:stCondLst>
                                   <p:childTnLst>
                                     <p:set>
                                       <p:cBhvr>
-                                        <p:cTn id="26" dur="1" fill="hold">
-                                          <p:stCondLst>
-                                            <p:cond delay="0"/>
-                                          </p:stCondLst>
-                                        </p:cTn>
-                                        <p:tgtEl>
-                                          <p:spTgt spid="5">
-                                            <p:txEl>
-                                              <p:pRg st="6" end="6"/>
-                                            </p:txEl>
-                                          </p:spTgt>
-                                        </p:tgtEl>
-                                        <p:attrNameLst>
-                                          <p:attrName>style.visibility</p:attrName>
-                                        </p:attrNameLst>
-                                      </p:cBhvr>
-                                      <p:to>
-                                        <p:strVal val="visible"/>
-                                      </p:to>
-                                    </p:set>
-                                  </p:childTnLst>
-                                </p:cTn>
-                              </p:par>
-                              <p:par>
-                                <p:cTn id="27" presetID="1" presetClass="entr" presetSubtype="0" fill="hold" nodeType="withEffect">
-                                  <p:stCondLst>
-                                    <p:cond delay="0"/>
-                                  </p:stCondLst>
-                                  <p:childTnLst>
-                                    <p:set>
-                                      <p:cBhvr>
-                                        <p:cTn id="28" dur="1" fill="hold">
+                                        <p:cTn id="24" dur="1" fill="hold">
                                           <p:stCondLst>
                                             <p:cond delay="0"/>
                                           </p:stCondLst>
@@ -14917,10 +14806,15 @@
             <p:ph type="body" sz="quarter" idx="13"/>
           </p:nvPr>
         </p:nvSpPr>
-        <p:spPr/>
+        <p:spPr>
+          <a:xfrm>
+            <a:off x="196766" y="1224000"/>
+            <a:ext cx="9049234" cy="5634000"/>
+          </a:xfrm>
+        </p:spPr>
         <p:txBody>
           <a:bodyPr>
-            <a:normAutofit fontScale="77500" lnSpcReduction="20000"/>
+            <a:normAutofit fontScale="85000" lnSpcReduction="20000"/>
           </a:bodyPr>
           <a:lstStyle/>
           <a:p>
@@ -14930,6 +14824,14 @@
               </a:buClr>
             </a:pPr>
             <a:r>
+              <a:rPr lang="en-US" dirty="0">
+                <a:solidFill>
+                  <a:schemeClr val="bg1"/>
+                </a:solidFill>
+              </a:rPr>
+              <a:t>͏</a:t>
+            </a:r>
+            <a:r>
               <a:rPr lang="bg-BG" b="1" dirty="0">
                 <a:solidFill>
                   <a:schemeClr val="bg1"/>
@@ -14973,6 +14875,14 @@
               </a:buClr>
             </a:pPr>
             <a:r>
+              <a:rPr lang="en-US" dirty="0">
+                <a:solidFill>
+                  <a:schemeClr val="bg1"/>
+                </a:solidFill>
+              </a:rPr>
+              <a:t>͏</a:t>
+            </a:r>
+            <a:r>
               <a:rPr lang="bg-BG" b="1" dirty="0">
                 <a:solidFill>
                   <a:schemeClr val="bg1"/>
@@ -15020,12 +14930,20 @@
               </a:buClr>
             </a:pPr>
             <a:r>
+              <a:rPr lang="en-US" dirty="0">
+                <a:solidFill>
+                  <a:schemeClr val="bg1"/>
+                </a:solidFill>
+              </a:rPr>
+              <a:t>͏</a:t>
+            </a:r>
+            <a:r>
               <a:rPr lang="bg-BG" b="1" dirty="0">
                 <a:solidFill>
                   <a:schemeClr val="bg1"/>
                 </a:solidFill>
               </a:rPr>
-              <a:t>Избиране </a:t>
+              <a:t>Избор </a:t>
             </a:r>
             <a:r>
               <a:rPr lang="bg-BG" dirty="0"/>
@@ -15060,6 +14978,14 @@
               </a:buClr>
             </a:pPr>
             <a:r>
+              <a:rPr lang="bg-BG" dirty="0">
+                <a:solidFill>
+                  <a:schemeClr val="bg1"/>
+                </a:solidFill>
+              </a:rPr>
+              <a:t>͏</a:t>
+            </a:r>
+            <a:r>
               <a:rPr lang="bg-BG" b="1" dirty="0">
                 <a:solidFill>
                   <a:schemeClr val="bg1"/>
@@ -15111,6 +15037,14 @@
                 <a:schemeClr val="tx1"/>
               </a:buClr>
             </a:pPr>
+            <a:r>
+              <a:rPr lang="bg-BG" dirty="0">
+                <a:solidFill>
+                  <a:schemeClr val="bg1"/>
+                </a:solidFill>
+              </a:rPr>
+              <a:t>͏</a:t>
+            </a:r>
             <a:r>
               <a:rPr lang="en-US" b="1" dirty="0">
                 <a:solidFill>
@@ -15345,55 +15279,6 @@
                                         <p:tgtEl>
                                           <p:spTgt spid="444419">
                                             <p:txEl>
-                                              <p:pRg st="1" end="1"/>
-                                            </p:txEl>
-                                          </p:spTgt>
-                                        </p:tgtEl>
-                                        <p:attrNameLst>
-                                          <p:attrName>style.visibility</p:attrName>
-                                        </p:attrNameLst>
-                                      </p:cBhvr>
-                                      <p:to>
-                                        <p:strVal val="visible"/>
-                                      </p:to>
-                                    </p:set>
-                                  </p:childTnLst>
-                                </p:cTn>
-                              </p:par>
-                            </p:childTnLst>
-                          </p:cTn>
-                        </p:par>
-                      </p:childTnLst>
-                    </p:cTn>
-                  </p:par>
-                  <p:par>
-                    <p:cTn id="7" fill="hold">
-                      <p:stCondLst>
-                        <p:cond delay="indefinite"/>
-                      </p:stCondLst>
-                      <p:childTnLst>
-                        <p:par>
-                          <p:cTn id="8" fill="hold">
-                            <p:stCondLst>
-                              <p:cond delay="0"/>
-                            </p:stCondLst>
-                            <p:childTnLst>
-                              <p:par>
-                                <p:cTn id="9" presetID="1" presetClass="entr" presetSubtype="0" fill="hold" nodeType="clickEffect">
-                                  <p:stCondLst>
-                                    <p:cond delay="0"/>
-                                  </p:stCondLst>
-                                  <p:childTnLst>
-                                    <p:set>
-                                      <p:cBhvr>
-                                        <p:cTn id="10" dur="1" fill="hold">
-                                          <p:stCondLst>
-                                            <p:cond delay="0"/>
-                                          </p:stCondLst>
-                                        </p:cTn>
-                                        <p:tgtEl>
-                                          <p:spTgt spid="444419">
-                                            <p:txEl>
                                               <p:pRg st="2" end="2"/>
                                             </p:txEl>
                                           </p:spTgt>
@@ -15409,33 +15294,15 @@
                                   </p:childTnLst>
                                 </p:cTn>
                               </p:par>
-                            </p:childTnLst>
-                          </p:cTn>
-                        </p:par>
-                      </p:childTnLst>
-                    </p:cTn>
-                  </p:par>
-                  <p:par>
-                    <p:cTn id="11" fill="hold">
-                      <p:stCondLst>
-                        <p:cond delay="indefinite"/>
-                      </p:stCondLst>
-                      <p:childTnLst>
-                        <p:par>
-                          <p:cTn id="12" fill="hold">
-                            <p:stCondLst>
-                              <p:cond delay="0"/>
-                            </p:stCondLst>
-                            <p:childTnLst>
                               <p:par>
-                                <p:cTn id="13" presetID="1" presetClass="entr" presetSubtype="0" fill="hold" nodeType="clickEffect">
+                                <p:cTn id="7" presetID="1" presetClass="entr" presetSubtype="0" fill="hold" nodeType="withEffect">
                                   <p:stCondLst>
                                     <p:cond delay="0"/>
                                   </p:stCondLst>
                                   <p:childTnLst>
                                     <p:set>
                                       <p:cBhvr>
-                                        <p:cTn id="14" dur="1" fill="hold">
+                                        <p:cTn id="8" dur="1" fill="hold">
                                           <p:stCondLst>
                                             <p:cond delay="0"/>
                                           </p:stCondLst>
@@ -15465,19 +15332,99 @@
                     </p:cTn>
                   </p:par>
                   <p:par>
-                    <p:cTn id="15" fill="hold">
+                    <p:cTn id="9" fill="hold">
                       <p:stCondLst>
                         <p:cond delay="indefinite"/>
                       </p:stCondLst>
                       <p:childTnLst>
                         <p:par>
-                          <p:cTn id="16" fill="hold">
+                          <p:cTn id="10" fill="hold">
                             <p:stCondLst>
                               <p:cond delay="0"/>
                             </p:stCondLst>
                             <p:childTnLst>
                               <p:par>
-                                <p:cTn id="17" presetID="1" presetClass="entr" presetSubtype="0" fill="hold" nodeType="clickEffect">
+                                <p:cTn id="11" presetID="1" presetClass="entr" presetSubtype="0" fill="hold" nodeType="clickEffect">
+                                  <p:stCondLst>
+                                    <p:cond delay="0"/>
+                                  </p:stCondLst>
+                                  <p:childTnLst>
+                                    <p:set>
+                                      <p:cBhvr>
+                                        <p:cTn id="12" dur="1" fill="hold">
+                                          <p:stCondLst>
+                                            <p:cond delay="0"/>
+                                          </p:stCondLst>
+                                        </p:cTn>
+                                        <p:tgtEl>
+                                          <p:spTgt spid="444419">
+                                            <p:txEl>
+                                              <p:pRg st="4" end="4"/>
+                                            </p:txEl>
+                                          </p:spTgt>
+                                        </p:tgtEl>
+                                        <p:attrNameLst>
+                                          <p:attrName>style.visibility</p:attrName>
+                                        </p:attrNameLst>
+                                      </p:cBhvr>
+                                      <p:to>
+                                        <p:strVal val="visible"/>
+                                      </p:to>
+                                    </p:set>
+                                  </p:childTnLst>
+                                </p:cTn>
+                              </p:par>
+                            </p:childTnLst>
+                          </p:cTn>
+                        </p:par>
+                      </p:childTnLst>
+                    </p:cTn>
+                  </p:par>
+                  <p:par>
+                    <p:cTn id="13" fill="hold">
+                      <p:stCondLst>
+                        <p:cond delay="indefinite"/>
+                      </p:stCondLst>
+                      <p:childTnLst>
+                        <p:par>
+                          <p:cTn id="14" fill="hold">
+                            <p:stCondLst>
+                              <p:cond delay="0"/>
+                            </p:stCondLst>
+                            <p:childTnLst>
+                              <p:par>
+                                <p:cTn id="15" presetID="1" presetClass="entr" presetSubtype="0" fill="hold" nodeType="clickEffect">
+                                  <p:stCondLst>
+                                    <p:cond delay="0"/>
+                                  </p:stCondLst>
+                                  <p:childTnLst>
+                                    <p:set>
+                                      <p:cBhvr>
+                                        <p:cTn id="16" dur="1" fill="hold">
+                                          <p:stCondLst>
+                                            <p:cond delay="0"/>
+                                          </p:stCondLst>
+                                        </p:cTn>
+                                        <p:tgtEl>
+                                          <p:spTgt spid="444419">
+                                            <p:txEl>
+                                              <p:pRg st="5" end="5"/>
+                                            </p:txEl>
+                                          </p:spTgt>
+                                        </p:tgtEl>
+                                        <p:attrNameLst>
+                                          <p:attrName>style.visibility</p:attrName>
+                                        </p:attrNameLst>
+                                      </p:cBhvr>
+                                      <p:to>
+                                        <p:strVal val="visible"/>
+                                      </p:to>
+                                    </p:set>
+                                  </p:childTnLst>
+                                </p:cTn>
+                              </p:par>
+                              <p:par>
+                                <p:cTn id="17" presetID="1" presetClass="entr" presetSubtype="0" fill="hold" nodeType="withEffect">
                                   <p:stCondLst>
                                     <p:cond delay="0"/>
                                   </p:stCondLst>
@@ -15492,7 +15439,7 @@
                                         <p:tgtEl>
                                           <p:spTgt spid="444419">
                                             <p:txEl>
-                                              <p:pRg st="4" end="4"/>
+                                              <p:pRg st="6" end="6"/>
                                             </p:txEl>
                                           </p:spTgt>
                                         </p:tgtEl>
@@ -15541,7 +15488,7 @@
                                         <p:tgtEl>
                                           <p:spTgt spid="444419">
                                             <p:txEl>
-                                              <p:pRg st="5" end="5"/>
+                                              <p:pRg st="7" end="7"/>
                                             </p:txEl>
                                           </p:spTgt>
                                         </p:tgtEl>
@@ -15590,7 +15537,7 @@
                                         <p:tgtEl>
                                           <p:spTgt spid="444419">
                                             <p:txEl>
-                                              <p:pRg st="6" end="6"/>
+                                              <p:pRg st="8" end="8"/>
                                             </p:txEl>
                                           </p:spTgt>
                                         </p:tgtEl>
@@ -15632,104 +15579,6 @@
                                     <p:set>
                                       <p:cBhvr>
                                         <p:cTn id="30" dur="1" fill="hold">
-                                          <p:stCondLst>
-                                            <p:cond delay="0"/>
-                                          </p:stCondLst>
-                                        </p:cTn>
-                                        <p:tgtEl>
-                                          <p:spTgt spid="444419">
-                                            <p:txEl>
-                                              <p:pRg st="7" end="7"/>
-                                            </p:txEl>
-                                          </p:spTgt>
-                                        </p:tgtEl>
-                                        <p:attrNameLst>
-                                          <p:attrName>style.visibility</p:attrName>
-                                        </p:attrNameLst>
-                                      </p:cBhvr>
-                                      <p:to>
-                                        <p:strVal val="visible"/>
-                                      </p:to>
-                                    </p:set>
-                                  </p:childTnLst>
-                                </p:cTn>
-                              </p:par>
-                            </p:childTnLst>
-                          </p:cTn>
-                        </p:par>
-                      </p:childTnLst>
-                    </p:cTn>
-                  </p:par>
-                  <p:par>
-                    <p:cTn id="31" fill="hold">
-                      <p:stCondLst>
-                        <p:cond delay="indefinite"/>
-                      </p:stCondLst>
-                      <p:childTnLst>
-                        <p:par>
-                          <p:cTn id="32" fill="hold">
-                            <p:stCondLst>
-                              <p:cond delay="0"/>
-                            </p:stCondLst>
-                            <p:childTnLst>
-                              <p:par>
-                                <p:cTn id="33" presetID="1" presetClass="entr" presetSubtype="0" fill="hold" nodeType="clickEffect">
-                                  <p:stCondLst>
-                                    <p:cond delay="0"/>
-                                  </p:stCondLst>
-                                  <p:childTnLst>
-                                    <p:set>
-                                      <p:cBhvr>
-                                        <p:cTn id="34" dur="1" fill="hold">
-                                          <p:stCondLst>
-                                            <p:cond delay="0"/>
-                                          </p:stCondLst>
-                                        </p:cTn>
-                                        <p:tgtEl>
-                                          <p:spTgt spid="444419">
-                                            <p:txEl>
-                                              <p:pRg st="8" end="8"/>
-                                            </p:txEl>
-                                          </p:spTgt>
-                                        </p:tgtEl>
-                                        <p:attrNameLst>
-                                          <p:attrName>style.visibility</p:attrName>
-                                        </p:attrNameLst>
-                                      </p:cBhvr>
-                                      <p:to>
-                                        <p:strVal val="visible"/>
-                                      </p:to>
-                                    </p:set>
-                                  </p:childTnLst>
-                                </p:cTn>
-                              </p:par>
-                            </p:childTnLst>
-                          </p:cTn>
-                        </p:par>
-                      </p:childTnLst>
-                    </p:cTn>
-                  </p:par>
-                  <p:par>
-                    <p:cTn id="35" fill="hold">
-                      <p:stCondLst>
-                        <p:cond delay="indefinite"/>
-                      </p:stCondLst>
-                      <p:childTnLst>
-                        <p:par>
-                          <p:cTn id="36" fill="hold">
-                            <p:stCondLst>
-                              <p:cond delay="0"/>
-                            </p:stCondLst>
-                            <p:childTnLst>
-                              <p:par>
-                                <p:cTn id="37" presetID="1" presetClass="entr" presetSubtype="0" fill="hold" nodeType="clickEffect">
-                                  <p:stCondLst>
-                                    <p:cond delay="0"/>
-                                  </p:stCondLst>
-                                  <p:childTnLst>
-                                    <p:set>
-                                      <p:cBhvr>
-                                        <p:cTn id="38" dur="1" fill="hold">
                                           <p:stCondLst>
                                             <p:cond delay="0"/>
                                           </p:stCondLst>
@@ -15901,7 +15750,7 @@
           <p:nvPr>
             <p:extLst>
               <p:ext uri="{D42A27DB-BD31-4B8C-83A1-F6EECF244321}">
-                <p14:modId xmlns:p14="http://schemas.microsoft.com/office/powerpoint/2010/main" val="2938999467"/>
+                <p14:modId xmlns:p14="http://schemas.microsoft.com/office/powerpoint/2010/main" val="3261715053"/>
               </p:ext>
             </p:extLst>
           </p:nvPr>
@@ -15988,7 +15837,7 @@
                       </a:endParaRPr>
                     </a:p>
                   </a:txBody>
-                  <a:tcPr marL="91416" marR="91416" marT="45708" marB="45708"/>
+                  <a:tcPr marL="91416" marR="91416" marT="45708" marB="45708" anchor="ctr"/>
                 </a:tc>
                 <a:tc>
                   <a:txBody>
@@ -16010,7 +15859,7 @@
                       </a:endParaRPr>
                     </a:p>
                   </a:txBody>
-                  <a:tcPr marL="91416" marR="91416" marT="45708" marB="45708"/>
+                  <a:tcPr marL="91416" marR="91416" marT="45708" marB="45708" anchor="ctr"/>
                 </a:tc>
                 <a:tc>
                   <a:txBody>
@@ -16032,7 +15881,7 @@
                       </a:endParaRPr>
                     </a:p>
                   </a:txBody>
-                  <a:tcPr marL="91416" marR="91416" marT="45708" marB="45708"/>
+                  <a:tcPr marL="91416" marR="91416" marT="45708" marB="45708" anchor="ctr"/>
                 </a:tc>
                 <a:tc>
                   <a:txBody>
@@ -16054,7 +15903,7 @@
                       </a:endParaRPr>
                     </a:p>
                   </a:txBody>
-                  <a:tcPr marL="91416" marR="91416" marT="45708" marB="45708"/>
+                  <a:tcPr marL="91416" marR="91416" marT="45708" marB="45708" anchor="ctr"/>
                 </a:tc>
                 <a:tc>
                   <a:txBody>
@@ -16076,7 +15925,7 @@
                       </a:endParaRPr>
                     </a:p>
                   </a:txBody>
-                  <a:tcPr marL="91416" marR="91416" marT="45708" marB="45708"/>
+                  <a:tcPr marL="91416" marR="91416" marT="45708" marB="45708" anchor="ctr"/>
                 </a:tc>
                 <a:tc>
                   <a:txBody>
@@ -16098,7 +15947,7 @@
                       </a:endParaRPr>
                     </a:p>
                   </a:txBody>
-                  <a:tcPr marL="91416" marR="91416" marT="45708" marB="45708"/>
+                  <a:tcPr marL="91416" marR="91416" marT="45708" marB="45708" anchor="ctr"/>
                 </a:tc>
                 <a:tc>
                   <a:txBody>
@@ -16120,7 +15969,7 @@
                       </a:endParaRPr>
                     </a:p>
                   </a:txBody>
-                  <a:tcPr marL="91416" marR="91416" marT="45708" marB="45708"/>
+                  <a:tcPr marL="91416" marR="91416" marT="45708" marB="45708" anchor="ctr"/>
                 </a:tc>
                 <a:extLst>
                   <a:ext uri="{0D108BD9-81ED-4DB2-BD59-A6C34878D82A}">
@@ -16148,7 +15997,7 @@
                       </a:r>
                     </a:p>
                   </a:txBody>
-                  <a:tcPr marL="91416" marR="91416" marT="45708" marB="45708"/>
+                  <a:tcPr marL="91416" marR="91416" marT="45708" marB="45708" anchor="ctr"/>
                 </a:tc>
                 <a:tc>
                   <a:txBody>
@@ -16180,7 +16029,7 @@
                       </a:r>
                     </a:p>
                   </a:txBody>
-                  <a:tcPr marL="91416" marR="91416" marT="45708" marB="45708"/>
+                  <a:tcPr marL="91416" marR="91416" marT="45708" marB="45708" anchor="ctr"/>
                 </a:tc>
                 <a:tc>
                   <a:txBody>
@@ -16212,7 +16061,7 @@
                       </a:r>
                     </a:p>
                   </a:txBody>
-                  <a:tcPr marL="91416" marR="91416" marT="45708" marB="45708"/>
+                  <a:tcPr marL="91416" marR="91416" marT="45708" marB="45708" anchor="ctr"/>
                 </a:tc>
                 <a:tc>
                   <a:txBody>
@@ -16244,7 +16093,7 @@
                       </a:r>
                     </a:p>
                   </a:txBody>
-                  <a:tcPr marL="91416" marR="91416" marT="45708" marB="45708"/>
+                  <a:tcPr marL="91416" marR="91416" marT="45708" marB="45708" anchor="ctr"/>
                 </a:tc>
                 <a:tc>
                   <a:txBody>
@@ -16265,7 +16114,7 @@
                       </a:r>
                     </a:p>
                   </a:txBody>
-                  <a:tcPr marL="91416" marR="91416" marT="45708" marB="45708"/>
+                  <a:tcPr marL="91416" marR="91416" marT="45708" marB="45708" anchor="ctr"/>
                 </a:tc>
                 <a:tc>
                   <a:txBody>
@@ -16294,7 +16143,7 @@
                       </a:endParaRPr>
                     </a:p>
                   </a:txBody>
-                  <a:tcPr marL="91416" marR="91416" marT="45708" marB="45708"/>
+                  <a:tcPr marL="91416" marR="91416" marT="45708" marB="45708" anchor="ctr"/>
                 </a:tc>
                 <a:tc>
                   <a:txBody>
@@ -16316,7 +16165,7 @@
                       </a:endParaRPr>
                     </a:p>
                   </a:txBody>
-                  <a:tcPr marL="91416" marR="91416" marT="45708" marB="45708"/>
+                  <a:tcPr marL="91416" marR="91416" marT="45708" marB="45708" anchor="ctr"/>
                 </a:tc>
                 <a:extLst>
                   <a:ext uri="{0D108BD9-81ED-4DB2-BD59-A6C34878D82A}">
@@ -16344,7 +16193,7 @@
                       </a:r>
                     </a:p>
                   </a:txBody>
-                  <a:tcPr marL="91416" marR="91416" marT="45708" marB="45708"/>
+                  <a:tcPr marL="91416" marR="91416" marT="45708" marB="45708" anchor="ctr"/>
                 </a:tc>
                 <a:tc>
                   <a:txBody>
@@ -16365,7 +16214,7 @@
                       </a:r>
                     </a:p>
                   </a:txBody>
-                  <a:tcPr marL="91416" marR="91416" marT="45708" marB="45708"/>
+                  <a:tcPr marL="91416" marR="91416" marT="45708" marB="45708" anchor="ctr"/>
                 </a:tc>
                 <a:tc>
                   <a:txBody>
@@ -16413,7 +16262,7 @@
                       </a:r>
                     </a:p>
                   </a:txBody>
-                  <a:tcPr marL="91416" marR="91416" marT="45708" marB="45708"/>
+                  <a:tcPr marL="91416" marR="91416" marT="45708" marB="45708" anchor="ctr"/>
                 </a:tc>
                 <a:tc>
                   <a:txBody>
@@ -16461,7 +16310,7 @@
                       </a:r>
                     </a:p>
                   </a:txBody>
-                  <a:tcPr marL="91416" marR="91416" marT="45708" marB="45708"/>
+                  <a:tcPr marL="91416" marR="91416" marT="45708" marB="45708" anchor="ctr"/>
                 </a:tc>
                 <a:tc>
                   <a:txBody>
@@ -16482,7 +16331,7 @@
                       </a:r>
                     </a:p>
                   </a:txBody>
-                  <a:tcPr marL="91416" marR="91416" marT="45708" marB="45708"/>
+                  <a:tcPr marL="91416" marR="91416" marT="45708" marB="45708" anchor="ctr"/>
                 </a:tc>
                 <a:tc>
                   <a:txBody>
@@ -16511,7 +16360,7 @@
                       </a:endParaRPr>
                     </a:p>
                   </a:txBody>
-                  <a:tcPr marL="91416" marR="91416" marT="45708" marB="45708"/>
+                  <a:tcPr marL="91416" marR="91416" marT="45708" marB="45708" anchor="ctr"/>
                 </a:tc>
                 <a:tc>
                   <a:txBody>
@@ -16533,7 +16382,7 @@
                       </a:endParaRPr>
                     </a:p>
                   </a:txBody>
-                  <a:tcPr marL="91416" marR="91416" marT="45708" marB="45708"/>
+                  <a:tcPr marL="91416" marR="91416" marT="45708" marB="45708" anchor="ctr"/>
                 </a:tc>
                 <a:extLst>
                   <a:ext uri="{0D108BD9-81ED-4DB2-BD59-A6C34878D82A}">
@@ -16561,7 +16410,7 @@
                       </a:r>
                     </a:p>
                   </a:txBody>
-                  <a:tcPr marL="91416" marR="91416" marT="45708" marB="45708"/>
+                  <a:tcPr marL="91416" marR="91416" marT="45708" marB="45708" anchor="ctr"/>
                 </a:tc>
                 <a:tc>
                   <a:txBody>
@@ -16582,7 +16431,7 @@
                       </a:r>
                     </a:p>
                   </a:txBody>
-                  <a:tcPr marL="91416" marR="91416" marT="45708" marB="45708"/>
+                  <a:tcPr marL="91416" marR="91416" marT="45708" marB="45708" anchor="ctr"/>
                 </a:tc>
                 <a:tc>
                   <a:txBody>
@@ -16630,7 +16479,7 @@
                       </a:r>
                     </a:p>
                   </a:txBody>
-                  <a:tcPr marL="91416" marR="91416" marT="45708" marB="45708"/>
+                  <a:tcPr marL="91416" marR="91416" marT="45708" marB="45708" anchor="ctr"/>
                 </a:tc>
                 <a:tc>
                   <a:txBody>
@@ -16678,7 +16527,7 @@
                       </a:r>
                     </a:p>
                   </a:txBody>
-                  <a:tcPr marL="91416" marR="91416" marT="45708" marB="45708"/>
+                  <a:tcPr marL="91416" marR="91416" marT="45708" marB="45708" anchor="ctr"/>
                 </a:tc>
                 <a:tc>
                   <a:txBody>
@@ -16699,7 +16548,7 @@
                       </a:r>
                     </a:p>
                   </a:txBody>
-                  <a:tcPr marL="91416" marR="91416" marT="45708" marB="45708"/>
+                  <a:tcPr marL="91416" marR="91416" marT="45708" marB="45708" anchor="ctr"/>
                 </a:tc>
                 <a:tc>
                   <a:txBody>
@@ -16728,7 +16577,7 @@
                       </a:endParaRPr>
                     </a:p>
                   </a:txBody>
-                  <a:tcPr marL="91416" marR="91416" marT="45708" marB="45708"/>
+                  <a:tcPr marL="91416" marR="91416" marT="45708" marB="45708" anchor="ctr"/>
                 </a:tc>
                 <a:tc>
                   <a:txBody>
@@ -16757,7 +16606,7 @@
                       </a:endParaRPr>
                     </a:p>
                   </a:txBody>
-                  <a:tcPr marL="91416" marR="91416" marT="45708" marB="45708"/>
+                  <a:tcPr marL="91416" marR="91416" marT="45708" marB="45708" anchor="ctr"/>
                 </a:tc>
                 <a:extLst>
                   <a:ext uri="{0D108BD9-81ED-4DB2-BD59-A6C34878D82A}">
@@ -16785,7 +16634,7 @@
                       </a:r>
                     </a:p>
                   </a:txBody>
-                  <a:tcPr marL="91416" marR="91416" marT="45708" marB="45708"/>
+                  <a:tcPr marL="91416" marR="91416" marT="45708" marB="45708" anchor="ctr"/>
                 </a:tc>
                 <a:tc>
                   <a:txBody>
@@ -16806,7 +16655,7 @@
                       </a:r>
                     </a:p>
                   </a:txBody>
-                  <a:tcPr marL="91416" marR="91416" marT="45708" marB="45708"/>
+                  <a:tcPr marL="91416" marR="91416" marT="45708" marB="45708" anchor="ctr"/>
                 </a:tc>
                 <a:tc>
                   <a:txBody>
@@ -16843,7 +16692,7 @@
                       </a:r>
                     </a:p>
                   </a:txBody>
-                  <a:tcPr marL="91416" marR="91416" marT="45708" marB="45708"/>
+                  <a:tcPr marL="91416" marR="91416" marT="45708" marB="45708" anchor="ctr"/>
                 </a:tc>
                 <a:tc>
                   <a:txBody>
@@ -16891,7 +16740,7 @@
                       </a:r>
                     </a:p>
                   </a:txBody>
-                  <a:tcPr marL="91416" marR="91416" marT="45708" marB="45708"/>
+                  <a:tcPr marL="91416" marR="91416" marT="45708" marB="45708" anchor="ctr"/>
                 </a:tc>
                 <a:tc>
                   <a:txBody>
@@ -16912,7 +16761,7 @@
                       </a:r>
                     </a:p>
                   </a:txBody>
-                  <a:tcPr marL="91416" marR="91416" marT="45708" marB="45708"/>
+                  <a:tcPr marL="91416" marR="91416" marT="45708" marB="45708" anchor="ctr"/>
                 </a:tc>
                 <a:tc>
                   <a:txBody>
@@ -16941,7 +16790,7 @@
                       </a:endParaRPr>
                     </a:p>
                   </a:txBody>
-                  <a:tcPr marL="91416" marR="91416" marT="45708" marB="45708"/>
+                  <a:tcPr marL="91416" marR="91416" marT="45708" marB="45708" anchor="ctr"/>
                 </a:tc>
                 <a:tc>
                   <a:txBody>
@@ -16970,7 +16819,7 @@
                       </a:endParaRPr>
                     </a:p>
                   </a:txBody>
-                  <a:tcPr marL="91416" marR="91416" marT="45708" marB="45708"/>
+                  <a:tcPr marL="91416" marR="91416" marT="45708" marB="45708" anchor="ctr"/>
                 </a:tc>
                 <a:extLst>
                   <a:ext uri="{0D108BD9-81ED-4DB2-BD59-A6C34878D82A}">
@@ -16998,7 +16847,7 @@
                       </a:r>
                     </a:p>
                   </a:txBody>
-                  <a:tcPr marL="91416" marR="91416" marT="45708" marB="45708"/>
+                  <a:tcPr marL="91416" marR="91416" marT="45708" marB="45708" anchor="ctr"/>
                 </a:tc>
                 <a:tc>
                   <a:txBody>
@@ -17035,7 +16884,7 @@
                       </a:r>
                     </a:p>
                   </a:txBody>
-                  <a:tcPr marL="91416" marR="91416" marT="45708" marB="45708"/>
+                  <a:tcPr marL="91416" marR="91416" marT="45708" marB="45708" anchor="ctr"/>
                 </a:tc>
                 <a:tc>
                   <a:txBody>
@@ -17072,7 +16921,7 @@
                       </a:r>
                     </a:p>
                   </a:txBody>
-                  <a:tcPr marL="91416" marR="91416" marT="45708" marB="45708"/>
+                  <a:tcPr marL="91416" marR="91416" marT="45708" marB="45708" anchor="ctr"/>
                 </a:tc>
                 <a:tc>
                   <a:txBody>
@@ -17109,7 +16958,7 @@
                       </a:r>
                     </a:p>
                   </a:txBody>
-                  <a:tcPr marL="91416" marR="91416" marT="45708" marB="45708"/>
+                  <a:tcPr marL="91416" marR="91416" marT="45708" marB="45708" anchor="ctr"/>
                 </a:tc>
                 <a:tc>
                   <a:txBody>
@@ -17130,7 +16979,7 @@
                       </a:r>
                     </a:p>
                   </a:txBody>
-                  <a:tcPr marL="91416" marR="91416" marT="45708" marB="45708"/>
+                  <a:tcPr marL="91416" marR="91416" marT="45708" marB="45708" anchor="ctr"/>
                 </a:tc>
                 <a:tc>
                   <a:txBody>
@@ -17159,7 +17008,7 @@
                       </a:endParaRPr>
                     </a:p>
                   </a:txBody>
-                  <a:tcPr marL="91416" marR="91416" marT="45708" marB="45708"/>
+                  <a:tcPr marL="91416" marR="91416" marT="45708" marB="45708" anchor="ctr"/>
                 </a:tc>
                 <a:tc>
                   <a:txBody>
@@ -17188,7 +17037,7 @@
                       </a:endParaRPr>
                     </a:p>
                   </a:txBody>
-                  <a:tcPr marL="91416" marR="91416" marT="45708" marB="45708"/>
+                  <a:tcPr marL="91416" marR="91416" marT="45708" marB="45708" anchor="ctr"/>
                 </a:tc>
                 <a:extLst>
                   <a:ext uri="{0D108BD9-81ED-4DB2-BD59-A6C34878D82A}">
@@ -17665,14 +17514,14 @@
             </a:pPr>
             <a:r>
               <a:rPr lang="bg-BG" dirty="0"/>
-              <a:t>Използвайте специално сортиране </a:t>
+              <a:t>Използвайте специално сортиране  в специален </a:t>
             </a:r>
             <a:br>
               <a:rPr lang="bg-BG" dirty="0"/>
             </a:br>
             <a:r>
               <a:rPr lang="bg-BG" dirty="0"/>
-              <a:t>в специален случай</a:t>
+              <a:t>случай</a:t>
             </a:r>
             <a:endParaRPr lang="en-US" dirty="0"/>
           </a:p>
@@ -17758,7 +17607,7 @@
           <a:p>
             <a:r>
               <a:rPr lang="bg-BG" dirty="0"/>
-              <a:t>Как да изберем алгоритъм за сортиране</a:t>
+              <a:t>Как да изберем алгоритъм за сортиране?</a:t>
             </a:r>
             <a:endParaRPr lang="en-US" dirty="0"/>
           </a:p>
@@ -17786,7 +17635,7 @@
         </p:blipFill>
         <p:spPr>
           <a:xfrm>
-            <a:off x="8954568" y="2642436"/>
+            <a:off x="8954568" y="2723531"/>
             <a:ext cx="3047030" cy="2505469"/>
           </a:xfrm>
           <a:prstGeom prst="rect">
@@ -17912,33 +17761,15 @@
                                   </p:childTnLst>
                                 </p:cTn>
                               </p:par>
-                            </p:childTnLst>
-                          </p:cTn>
-                        </p:par>
-                      </p:childTnLst>
-                    </p:cTn>
-                  </p:par>
-                  <p:par>
-                    <p:cTn id="7" fill="hold">
-                      <p:stCondLst>
-                        <p:cond delay="indefinite"/>
-                      </p:stCondLst>
-                      <p:childTnLst>
-                        <p:par>
-                          <p:cTn id="8" fill="hold">
-                            <p:stCondLst>
-                              <p:cond delay="0"/>
-                            </p:stCondLst>
-                            <p:childTnLst>
                               <p:par>
-                                <p:cTn id="9" presetID="1" presetClass="entr" presetSubtype="0" fill="hold" nodeType="clickEffect">
+                                <p:cTn id="7" presetID="1" presetClass="entr" presetSubtype="0" fill="hold" nodeType="withEffect">
                                   <p:stCondLst>
                                     <p:cond delay="0"/>
                                   </p:stCondLst>
                                   <p:childTnLst>
                                     <p:set>
                                       <p:cBhvr>
-                                        <p:cTn id="10" dur="1" fill="hold">
+                                        <p:cTn id="8" dur="1" fill="hold">
                                           <p:stCondLst>
                                             <p:cond delay="0"/>
                                           </p:stCondLst>
@@ -17968,26 +17799,26 @@
                     </p:cTn>
                   </p:par>
                   <p:par>
-                    <p:cTn id="11" fill="hold">
+                    <p:cTn id="9" fill="hold">
                       <p:stCondLst>
                         <p:cond delay="indefinite"/>
                       </p:stCondLst>
                       <p:childTnLst>
                         <p:par>
-                          <p:cTn id="12" fill="hold">
+                          <p:cTn id="10" fill="hold">
                             <p:stCondLst>
                               <p:cond delay="0"/>
                             </p:stCondLst>
                             <p:childTnLst>
                               <p:par>
-                                <p:cTn id="13" presetID="1" presetClass="entr" presetSubtype="0" fill="hold" nodeType="clickEffect">
+                                <p:cTn id="11" presetID="1" presetClass="entr" presetSubtype="0" fill="hold" nodeType="clickEffect">
                                   <p:stCondLst>
                                     <p:cond delay="0"/>
                                   </p:stCondLst>
                                   <p:childTnLst>
                                     <p:set>
                                       <p:cBhvr>
-                                        <p:cTn id="14" dur="1" fill="hold">
+                                        <p:cTn id="12" dur="1" fill="hold">
                                           <p:stCondLst>
                                             <p:cond delay="0"/>
                                           </p:stCondLst>
@@ -18017,26 +17848,26 @@
                     </p:cTn>
                   </p:par>
                   <p:par>
-                    <p:cTn id="15" fill="hold">
+                    <p:cTn id="13" fill="hold">
                       <p:stCondLst>
                         <p:cond delay="indefinite"/>
                       </p:stCondLst>
                       <p:childTnLst>
                         <p:par>
-                          <p:cTn id="16" fill="hold">
+                          <p:cTn id="14" fill="hold">
                             <p:stCondLst>
                               <p:cond delay="0"/>
                             </p:stCondLst>
                             <p:childTnLst>
                               <p:par>
-                                <p:cTn id="17" presetID="1" presetClass="entr" presetSubtype="0" fill="hold" nodeType="clickEffect">
+                                <p:cTn id="15" presetID="1" presetClass="entr" presetSubtype="0" fill="hold" nodeType="clickEffect">
                                   <p:stCondLst>
                                     <p:cond delay="0"/>
                                   </p:stCondLst>
                                   <p:childTnLst>
                                     <p:set>
                                       <p:cBhvr>
-                                        <p:cTn id="18" dur="1" fill="hold">
+                                        <p:cTn id="16" dur="1" fill="hold">
                                           <p:stCondLst>
                                             <p:cond delay="0"/>
                                           </p:stCondLst>
@@ -18066,19 +17897,50 @@
                     </p:cTn>
                   </p:par>
                   <p:par>
-                    <p:cTn id="19" fill="hold">
+                    <p:cTn id="17" fill="hold">
                       <p:stCondLst>
                         <p:cond delay="indefinite"/>
                       </p:stCondLst>
                       <p:childTnLst>
                         <p:par>
-                          <p:cTn id="20" fill="hold">
+                          <p:cTn id="18" fill="hold">
                             <p:stCondLst>
                               <p:cond delay="0"/>
                             </p:stCondLst>
                             <p:childTnLst>
                               <p:par>
-                                <p:cTn id="21" presetID="1" presetClass="entr" presetSubtype="0" fill="hold" nodeType="clickEffect">
+                                <p:cTn id="19" presetID="1" presetClass="entr" presetSubtype="0" fill="hold" nodeType="clickEffect">
+                                  <p:stCondLst>
+                                    <p:cond delay="0"/>
+                                  </p:stCondLst>
+                                  <p:childTnLst>
+                                    <p:set>
+                                      <p:cBhvr>
+                                        <p:cTn id="20" dur="1" fill="hold">
+                                          <p:stCondLst>
+                                            <p:cond delay="0"/>
+                                          </p:stCondLst>
+                                        </p:cTn>
+                                        <p:tgtEl>
+                                          <p:spTgt spid="3">
+                                            <p:txEl>
+                                              <p:pRg st="5" end="5"/>
+                                            </p:txEl>
+                                          </p:spTgt>
+                                        </p:tgtEl>
+                                        <p:attrNameLst>
+                                          <p:attrName>style.visibility</p:attrName>
+                                        </p:attrNameLst>
+                                      </p:cBhvr>
+                                      <p:to>
+                                        <p:strVal val="visible"/>
+                                      </p:to>
+                                    </p:set>
+                                  </p:childTnLst>
+                                </p:cTn>
+                              </p:par>
+                              <p:par>
+                                <p:cTn id="21" presetID="1" presetClass="entr" presetSubtype="0" fill="hold" nodeType="withEffect">
                                   <p:stCondLst>
                                     <p:cond delay="0"/>
                                   </p:stCondLst>
@@ -18091,11 +17953,7 @@
                                           </p:stCondLst>
                                         </p:cTn>
                                         <p:tgtEl>
-                                          <p:spTgt spid="3">
-                                            <p:txEl>
-                                              <p:pRg st="5" end="5"/>
-                                            </p:txEl>
-                                          </p:spTgt>
+                                          <p:spTgt spid="7"/>
                                         </p:tgtEl>
                                         <p:attrNameLst>
                                           <p:attrName>style.visibility</p:attrName>
@@ -18122,7 +17980,11 @@
                                           </p:stCondLst>
                                         </p:cTn>
                                         <p:tgtEl>
-                                          <p:spTgt spid="7"/>
+                                          <p:spTgt spid="3">
+                                            <p:txEl>
+                                              <p:pRg st="6" end="6"/>
+                                            </p:txEl>
+                                          </p:spTgt>
                                         </p:tgtEl>
                                         <p:attrNameLst>
                                           <p:attrName>style.visibility</p:attrName>
@@ -18162,55 +18024,6 @@
                                     <p:set>
                                       <p:cBhvr>
                                         <p:cTn id="28" dur="1" fill="hold">
-                                          <p:stCondLst>
-                                            <p:cond delay="0"/>
-                                          </p:stCondLst>
-                                        </p:cTn>
-                                        <p:tgtEl>
-                                          <p:spTgt spid="3">
-                                            <p:txEl>
-                                              <p:pRg st="6" end="6"/>
-                                            </p:txEl>
-                                          </p:spTgt>
-                                        </p:tgtEl>
-                                        <p:attrNameLst>
-                                          <p:attrName>style.visibility</p:attrName>
-                                        </p:attrNameLst>
-                                      </p:cBhvr>
-                                      <p:to>
-                                        <p:strVal val="visible"/>
-                                      </p:to>
-                                    </p:set>
-                                  </p:childTnLst>
-                                </p:cTn>
-                              </p:par>
-                            </p:childTnLst>
-                          </p:cTn>
-                        </p:par>
-                      </p:childTnLst>
-                    </p:cTn>
-                  </p:par>
-                  <p:par>
-                    <p:cTn id="29" fill="hold">
-                      <p:stCondLst>
-                        <p:cond delay="indefinite"/>
-                      </p:stCondLst>
-                      <p:childTnLst>
-                        <p:par>
-                          <p:cTn id="30" fill="hold">
-                            <p:stCondLst>
-                              <p:cond delay="0"/>
-                            </p:stCondLst>
-                            <p:childTnLst>
-                              <p:par>
-                                <p:cTn id="31" presetID="1" presetClass="entr" presetSubtype="0" fill="hold" nodeType="clickEffect">
-                                  <p:stCondLst>
-                                    <p:cond delay="0"/>
-                                  </p:stCondLst>
-                                  <p:childTnLst>
-                                    <p:set>
-                                      <p:cBhvr>
-                                        <p:cTn id="32" dur="1" fill="hold">
                                           <p:stCondLst>
                                             <p:cond delay="0"/>
                                           </p:stCondLst>
@@ -18513,6 +18326,44 @@
       </p:grpSpPr>
       <p:sp>
         <p:nvSpPr>
+          <p:cNvPr id="7" name="Slide Number">
+            <a:extLst>
+              <a:ext uri="{FF2B5EF4-FFF2-40B4-BE49-F238E27FC236}">
+                <a16:creationId xmlns:a16="http://schemas.microsoft.com/office/drawing/2014/main" id="{DE1C1DB0-6576-4BDD-9AF7-16EAC60B7A17}"/>
+              </a:ext>
+            </a:extLst>
+          </p:cNvPr>
+          <p:cNvSpPr>
+            <a:spLocks noGrp="1"/>
+          </p:cNvSpPr>
+          <p:nvPr>
+            <p:ph type="sldNum" sz="quarter" idx="4"/>
+          </p:nvPr>
+        </p:nvSpPr>
+        <p:spPr>
+          <a:prstGeom prst="rect">
+            <a:avLst/>
+          </a:prstGeom>
+        </p:spPr>
+        <p:txBody>
+          <a:bodyPr vert="horz" lIns="91440" tIns="45720" rIns="91440" bIns="45720" rtlCol="0" anchor="b"/>
+          <a:lstStyle>
+            <a:lvl1pPr algn="r">
+              <a:defRPr sz="1000"/>
+            </a:lvl1pPr>
+          </a:lstStyle>
+          <a:p>
+            <a:fld id="{2BF067CD-8E6B-4360-9AA8-C5DF2A48A6D1}" type="slidenum">
+              <a:rPr lang="en-US" noProof="0" smtClean="0"/>
+              <a:pPr/>
+              <a:t>24</a:t>
+            </a:fld>
+            <a:endParaRPr lang="en-US" noProof="0" dirty="0"/>
+          </a:p>
+        </p:txBody>
+      </p:sp>
+      <p:sp>
+        <p:nvSpPr>
           <p:cNvPr id="2" name="Text Placeholder 1"/>
           <p:cNvSpPr>
             <a:spLocks noGrp="1"/>
@@ -18524,7 +18375,7 @@
         <p:spPr/>
         <p:txBody>
           <a:bodyPr>
-            <a:normAutofit fontScale="92500"/>
+            <a:normAutofit fontScale="92500" lnSpcReduction="10000"/>
           </a:bodyPr>
           <a:lstStyle/>
           <a:p>
@@ -18539,7 +18390,7 @@
                   <a:schemeClr val="bg1"/>
                 </a:solidFill>
               </a:rPr>
-              <a:t>Търсещи алгоритми </a:t>
+              <a:t>Търсещ алгоритъм </a:t>
             </a:r>
             <a:r>
               <a:rPr lang="en-US" dirty="0"/>
@@ -18547,7 +18398,31 @@
             </a:r>
             <a:r>
               <a:rPr lang="bg-BG" dirty="0"/>
-              <a:t>алгоритъм за намиране на елемент с определени свойства сред други елементи в колекция</a:t>
+              <a:t>алгоритъм за намиране на </a:t>
+            </a:r>
+            <a:r>
+              <a:rPr lang="bg-BG" b="1" dirty="0">
+                <a:solidFill>
+                  <a:schemeClr val="bg1"/>
+                </a:solidFill>
+              </a:rPr>
+              <a:t>елемент</a:t>
+            </a:r>
+            <a:r>
+              <a:rPr lang="bg-BG" dirty="0"/>
+              <a:t> с </a:t>
+            </a:r>
+            <a:r>
+              <a:rPr lang="bg-BG" b="1" dirty="0">
+                <a:solidFill>
+                  <a:schemeClr val="bg1"/>
+                </a:solidFill>
+              </a:rPr>
+              <a:t>определени свойства </a:t>
+            </a:r>
+            <a:r>
+              <a:rPr lang="bg-BG" dirty="0"/>
+              <a:t>сред други елементи в колекция</a:t>
             </a:r>
             <a:endParaRPr lang="en-US" dirty="0"/>
           </a:p>
@@ -18598,18 +18473,22 @@
             <a:endParaRPr lang="en-US" dirty="0"/>
           </a:p>
           <a:p>
-            <a:pPr lvl="2"/>
-            <a:r>
-              <a:rPr lang="ru-RU" dirty="0"/>
-              <a:t>Опитайте се да използвате частични знания за дадена структура</a:t>
-            </a:r>
-            <a:endParaRPr lang="en-US" dirty="0"/>
-          </a:p>
-          <a:p>
             <a:pPr lvl="1"/>
             <a:r>
               <a:rPr lang="bg-BG" dirty="0"/>
-              <a:t>За подструктура на дадена структура</a:t>
+              <a:t>За </a:t>
+            </a:r>
+            <a:r>
+              <a:rPr lang="bg-BG" b="1" dirty="0">
+                <a:solidFill>
+                  <a:schemeClr val="bg1"/>
+                </a:solidFill>
+              </a:rPr>
+              <a:t>подструктура</a:t>
+            </a:r>
+            <a:r>
+              <a:rPr lang="bg-BG" dirty="0"/>
+              <a:t> на дадена структура</a:t>
             </a:r>
             <a:endParaRPr lang="en-US" dirty="0"/>
           </a:p>
@@ -18712,12 +18591,7 @@
             <p:ph type="title"/>
           </p:nvPr>
         </p:nvSpPr>
-        <p:spPr>
-          <a:xfrm>
-            <a:off x="191945" y="88368"/>
-            <a:ext cx="9503571" cy="882424"/>
-          </a:xfrm>
-        </p:spPr>
+        <p:spPr/>
         <p:txBody>
           <a:bodyPr/>
           <a:lstStyle/>
@@ -18777,48 +18651,6 @@
           </a:extLst>
         </p:spPr>
       </p:pic>
-      <p:sp>
-        <p:nvSpPr>
-          <p:cNvPr id="7" name="Slide Number">
-            <a:extLst>
-              <a:ext uri="{FF2B5EF4-FFF2-40B4-BE49-F238E27FC236}">
-                <a16:creationId xmlns:a16="http://schemas.microsoft.com/office/drawing/2014/main" id="{DE1C1DB0-6576-4BDD-9AF7-16EAC60B7A17}"/>
-              </a:ext>
-            </a:extLst>
-          </p:cNvPr>
-          <p:cNvSpPr>
-            <a:spLocks noGrp="1"/>
-          </p:cNvSpPr>
-          <p:nvPr>
-            <p:ph type="sldNum" sz="quarter" idx="5"/>
-          </p:nvPr>
-        </p:nvSpPr>
-        <p:spPr>
-          <a:xfrm>
-            <a:off x="11753030" y="6507000"/>
-            <a:ext cx="367414" cy="297000"/>
-          </a:xfrm>
-          <a:prstGeom prst="rect">
-            <a:avLst/>
-          </a:prstGeom>
-        </p:spPr>
-        <p:txBody>
-          <a:bodyPr vert="horz" lIns="91440" tIns="45720" rIns="91440" bIns="45720" rtlCol="0" anchor="b"/>
-          <a:lstStyle>
-            <a:lvl1pPr algn="r">
-              <a:defRPr sz="1000"/>
-            </a:lvl1pPr>
-          </a:lstStyle>
-          <a:p>
-            <a:fld id="{2BF067CD-8E6B-4360-9AA8-C5DF2A48A6D1}" type="slidenum">
-              <a:rPr lang="en-US" noProof="0" smtClean="0"/>
-              <a:pPr/>
-              <a:t>24</a:t>
-            </a:fld>
-            <a:endParaRPr lang="en-US" noProof="0" dirty="0"/>
-          </a:p>
-        </p:txBody>
-      </p:sp>
     </p:spTree>
     <p:extLst>
       <p:ext uri="{BB962C8B-B14F-4D97-AF65-F5344CB8AC3E}">
@@ -18937,33 +18769,15 @@
                                   </p:childTnLst>
                                 </p:cTn>
                               </p:par>
-                            </p:childTnLst>
-                          </p:cTn>
-                        </p:par>
-                      </p:childTnLst>
-                    </p:cTn>
-                  </p:par>
-                  <p:par>
-                    <p:cTn id="11" fill="hold">
-                      <p:stCondLst>
-                        <p:cond delay="indefinite"/>
-                      </p:stCondLst>
-                      <p:childTnLst>
-                        <p:par>
-                          <p:cTn id="12" fill="hold">
-                            <p:stCondLst>
-                              <p:cond delay="0"/>
-                            </p:stCondLst>
-                            <p:childTnLst>
                               <p:par>
-                                <p:cTn id="13" presetID="1" presetClass="entr" presetSubtype="0" fill="hold" nodeType="clickEffect">
+                                <p:cTn id="11" presetID="1" presetClass="entr" presetSubtype="0" fill="hold" nodeType="withEffect">
                                   <p:stCondLst>
                                     <p:cond delay="0"/>
                                   </p:stCondLst>
                                   <p:childTnLst>
                                     <p:set>
                                       <p:cBhvr>
-                                        <p:cTn id="14" dur="1" fill="hold">
+                                        <p:cTn id="12" dur="1" fill="hold">
                                           <p:stCondLst>
                                             <p:cond delay="0"/>
                                           </p:stCondLst>
@@ -18993,19 +18807,50 @@
                     </p:cTn>
                   </p:par>
                   <p:par>
-                    <p:cTn id="15" fill="hold">
+                    <p:cTn id="13" fill="hold">
                       <p:stCondLst>
                         <p:cond delay="indefinite"/>
                       </p:stCondLst>
                       <p:childTnLst>
                         <p:par>
-                          <p:cTn id="16" fill="hold">
+                          <p:cTn id="14" fill="hold">
                             <p:stCondLst>
                               <p:cond delay="0"/>
                             </p:stCondLst>
                             <p:childTnLst>
                               <p:par>
-                                <p:cTn id="17" presetID="1" presetClass="entr" presetSubtype="0" fill="hold" nodeType="clickEffect">
+                                <p:cTn id="15" presetID="1" presetClass="entr" presetSubtype="0" fill="hold" nodeType="clickEffect">
+                                  <p:stCondLst>
+                                    <p:cond delay="0"/>
+                                  </p:stCondLst>
+                                  <p:childTnLst>
+                                    <p:set>
+                                      <p:cBhvr>
+                                        <p:cTn id="16" dur="1" fill="hold">
+                                          <p:stCondLst>
+                                            <p:cond delay="0"/>
+                                          </p:stCondLst>
+                                        </p:cTn>
+                                        <p:tgtEl>
+                                          <p:spTgt spid="2">
+                                            <p:txEl>
+                                              <p:pRg st="4" end="4"/>
+                                            </p:txEl>
+                                          </p:spTgt>
+                                        </p:tgtEl>
+                                        <p:attrNameLst>
+                                          <p:attrName>style.visibility</p:attrName>
+                                        </p:attrNameLst>
+                                      </p:cBhvr>
+                                      <p:to>
+                                        <p:strVal val="visible"/>
+                                      </p:to>
+                                    </p:set>
+                                  </p:childTnLst>
+                                </p:cTn>
+                              </p:par>
+                              <p:par>
+                                <p:cTn id="17" presetID="1" presetClass="entr" presetSubtype="0" fill="hold" nodeType="withEffect">
                                   <p:stCondLst>
                                     <p:cond delay="0"/>
                                   </p:stCondLst>
@@ -19020,7 +18865,7 @@
                                         <p:tgtEl>
                                           <p:spTgt spid="2">
                                             <p:txEl>
-                                              <p:pRg st="4" end="4"/>
+                                              <p:pRg st="5" end="5"/>
                                             </p:txEl>
                                           </p:spTgt>
                                         </p:tgtEl>
@@ -19069,105 +18914,7 @@
                                         <p:tgtEl>
                                           <p:spTgt spid="2">
                                             <p:txEl>
-                                              <p:pRg st="5" end="5"/>
-                                            </p:txEl>
-                                          </p:spTgt>
-                                        </p:tgtEl>
-                                        <p:attrNameLst>
-                                          <p:attrName>style.visibility</p:attrName>
-                                        </p:attrNameLst>
-                                      </p:cBhvr>
-                                      <p:to>
-                                        <p:strVal val="visible"/>
-                                      </p:to>
-                                    </p:set>
-                                  </p:childTnLst>
-                                </p:cTn>
-                              </p:par>
-                            </p:childTnLst>
-                          </p:cTn>
-                        </p:par>
-                      </p:childTnLst>
-                    </p:cTn>
-                  </p:par>
-                  <p:par>
-                    <p:cTn id="23" fill="hold">
-                      <p:stCondLst>
-                        <p:cond delay="indefinite"/>
-                      </p:stCondLst>
-                      <p:childTnLst>
-                        <p:par>
-                          <p:cTn id="24" fill="hold">
-                            <p:stCondLst>
-                              <p:cond delay="0"/>
-                            </p:stCondLst>
-                            <p:childTnLst>
-                              <p:par>
-                                <p:cTn id="25" presetID="1" presetClass="entr" presetSubtype="0" fill="hold" nodeType="clickEffect">
-                                  <p:stCondLst>
-                                    <p:cond delay="0"/>
-                                  </p:stCondLst>
-                                  <p:childTnLst>
-                                    <p:set>
-                                      <p:cBhvr>
-                                        <p:cTn id="26" dur="1" fill="hold">
-                                          <p:stCondLst>
-                                            <p:cond delay="0"/>
-                                          </p:stCondLst>
-                                        </p:cTn>
-                                        <p:tgtEl>
-                                          <p:spTgt spid="2">
-                                            <p:txEl>
                                               <p:pRg st="6" end="6"/>
-                                            </p:txEl>
-                                          </p:spTgt>
-                                        </p:tgtEl>
-                                        <p:attrNameLst>
-                                          <p:attrName>style.visibility</p:attrName>
-                                        </p:attrNameLst>
-                                      </p:cBhvr>
-                                      <p:to>
-                                        <p:strVal val="visible"/>
-                                      </p:to>
-                                    </p:set>
-                                  </p:childTnLst>
-                                </p:cTn>
-                              </p:par>
-                            </p:childTnLst>
-                          </p:cTn>
-                        </p:par>
-                      </p:childTnLst>
-                    </p:cTn>
-                  </p:par>
-                  <p:par>
-                    <p:cTn id="27" fill="hold">
-                      <p:stCondLst>
-                        <p:cond delay="indefinite"/>
-                      </p:stCondLst>
-                      <p:childTnLst>
-                        <p:par>
-                          <p:cTn id="28" fill="hold">
-                            <p:stCondLst>
-                              <p:cond delay="0"/>
-                            </p:stCondLst>
-                            <p:childTnLst>
-                              <p:par>
-                                <p:cTn id="29" presetID="1" presetClass="entr" presetSubtype="0" fill="hold" nodeType="clickEffect">
-                                  <p:stCondLst>
-                                    <p:cond delay="0"/>
-                                  </p:stCondLst>
-                                  <p:childTnLst>
-                                    <p:set>
-                                      <p:cBhvr>
-                                        <p:cTn id="30" dur="1" fill="hold">
-                                          <p:stCondLst>
-                                            <p:cond delay="0"/>
-                                          </p:stCondLst>
-                                        </p:cTn>
-                                        <p:tgtEl>
-                                          <p:spTgt spid="2">
-                                            <p:txEl>
-                                              <p:pRg st="7" end="7"/>
                                             </p:txEl>
                                           </p:spTgt>
                                         </p:tgtEl>
@@ -19232,6 +18979,44 @@
       </p:grpSpPr>
       <p:sp>
         <p:nvSpPr>
+          <p:cNvPr id="6" name="Slide Number">
+            <a:extLst>
+              <a:ext uri="{FF2B5EF4-FFF2-40B4-BE49-F238E27FC236}">
+                <a16:creationId xmlns:a16="http://schemas.microsoft.com/office/drawing/2014/main" id="{B64C7563-70FE-445C-8EFD-87FD023BDA94}"/>
+              </a:ext>
+            </a:extLst>
+          </p:cNvPr>
+          <p:cNvSpPr>
+            <a:spLocks noGrp="1"/>
+          </p:cNvSpPr>
+          <p:nvPr>
+            <p:ph type="sldNum" sz="quarter" idx="4"/>
+          </p:nvPr>
+        </p:nvSpPr>
+        <p:spPr>
+          <a:prstGeom prst="rect">
+            <a:avLst/>
+          </a:prstGeom>
+        </p:spPr>
+        <p:txBody>
+          <a:bodyPr vert="horz" lIns="91440" tIns="45720" rIns="91440" bIns="45720" rtlCol="0" anchor="b"/>
+          <a:lstStyle>
+            <a:lvl1pPr algn="r">
+              <a:defRPr sz="1000"/>
+            </a:lvl1pPr>
+          </a:lstStyle>
+          <a:p>
+            <a:fld id="{2BF067CD-8E6B-4360-9AA8-C5DF2A48A6D1}" type="slidenum">
+              <a:rPr lang="en-US" noProof="0" smtClean="0"/>
+              <a:pPr/>
+              <a:t>25</a:t>
+            </a:fld>
+            <a:endParaRPr lang="en-US" noProof="0" dirty="0"/>
+          </a:p>
+        </p:txBody>
+      </p:sp>
+      <p:sp>
+        <p:nvSpPr>
           <p:cNvPr id="2" name="Text Placeholder 1"/>
           <p:cNvSpPr>
             <a:spLocks noGrp="1"/>
@@ -19240,12 +19025,7 @@
             <p:ph type="body" sz="quarter" idx="10"/>
           </p:nvPr>
         </p:nvSpPr>
-        <p:spPr>
-          <a:xfrm>
-            <a:off x="71556" y="1128614"/>
-            <a:ext cx="11815018" cy="5527326"/>
-          </a:xfrm>
-        </p:spPr>
+        <p:spPr/>
         <p:txBody>
           <a:bodyPr>
             <a:normAutofit/>
@@ -19258,7 +19038,7 @@
               </a:buClr>
             </a:pPr>
             <a:r>
-              <a:rPr lang="bg-BG" sz="3200" b="1" dirty="0">
+              <a:rPr lang="bg-BG" sz="3600" b="1" dirty="0">
                 <a:solidFill>
                   <a:schemeClr val="bg1"/>
                 </a:solidFill>
@@ -19266,11 +19046,11 @@
               <a:t>Линейното търсене</a:t>
             </a:r>
             <a:r>
-              <a:rPr lang="bg-BG" sz="3200" dirty="0"/>
+              <a:rPr lang="bg-BG" sz="3600" dirty="0"/>
               <a:t> намира определена </a:t>
             </a:r>
             <a:r>
-              <a:rPr lang="bg-BG" sz="3200" b="1" dirty="0">
+              <a:rPr lang="bg-BG" sz="3600" b="1" dirty="0">
                 <a:solidFill>
                   <a:schemeClr val="bg1"/>
                 </a:solidFill>
@@ -19278,19 +19058,27 @@
               <a:t>стойност</a:t>
             </a:r>
             <a:r>
+              <a:rPr lang="bg-BG" sz="3600" dirty="0"/>
+              <a:t> в списък</a:t>
+            </a:r>
+            <a:r>
+              <a:rPr lang="en-US" sz="3600" dirty="0"/>
+              <a:t>, </a:t>
+            </a:r>
+            <a:r>
+              <a:rPr lang="bg-BG" sz="3600" dirty="0"/>
+              <a:t>като:</a:t>
+            </a:r>
+            <a:endParaRPr lang="en-US" sz="3600" dirty="0"/>
+          </a:p>
+          <a:p>
+            <a:pPr lvl="1"/>
+            <a:r>
               <a:rPr lang="bg-BG" sz="3200" dirty="0"/>
-              <a:t> в списък</a:t>
-            </a:r>
-            <a:endParaRPr lang="en-US" sz="3200" dirty="0"/>
-          </a:p>
-          <a:p>
-            <a:pPr lvl="1"/>
-            <a:r>
-              <a:rPr lang="bg-BG" sz="2800" dirty="0"/>
               <a:t>Проверява </a:t>
             </a:r>
             <a:r>
-              <a:rPr lang="bg-BG" sz="2800" b="1" dirty="0">
+              <a:rPr lang="bg-BG" sz="3200" b="1" dirty="0">
                 <a:solidFill>
                   <a:schemeClr val="bg1"/>
                 </a:solidFill>
@@ -19298,42 +19086,54 @@
               <a:t>всеки един </a:t>
             </a:r>
             <a:r>
-              <a:rPr lang="bg-BG" sz="2800" dirty="0"/>
+              <a:rPr lang="bg-BG" sz="3200" dirty="0"/>
               <a:t>от елементите</a:t>
             </a:r>
-            <a:endParaRPr lang="en-US" sz="2800" dirty="0"/>
+            <a:endParaRPr lang="en-US" sz="3200" dirty="0"/>
           </a:p>
           <a:p>
             <a:pPr lvl="1"/>
             <a:r>
-              <a:rPr lang="ru-RU" sz="2800" dirty="0"/>
-              <a:t>Един по един, в последователност, д</a:t>
-            </a:r>
-            <a:r>
-              <a:rPr lang="bg-BG" sz="2800" dirty="0"/>
-              <a:t>окато не е намерен желания елемент</a:t>
-            </a:r>
-            <a:endParaRPr lang="en-US" sz="2800" dirty="0"/>
-          </a:p>
-          <a:p>
+              <a:rPr lang="ru-RU" sz="3200" dirty="0"/>
+              <a:t>Един по един, </a:t>
+            </a:r>
+            <a:r>
+              <a:rPr lang="ru-RU" sz="3200" b="1" dirty="0">
+                <a:solidFill>
+                  <a:schemeClr val="bg1"/>
+                </a:solidFill>
+              </a:rPr>
+              <a:t>последователно</a:t>
+            </a:r>
+            <a:r>
+              <a:rPr lang="ru-RU" sz="3200" dirty="0"/>
+              <a:t>, д</a:t>
+            </a:r>
             <a:r>
               <a:rPr lang="bg-BG" sz="3200" dirty="0"/>
+              <a:t>окато не е намерен желаният елемент</a:t>
+            </a:r>
+            <a:endParaRPr lang="en-US" sz="3200" dirty="0"/>
+          </a:p>
+          <a:p>
+            <a:r>
+              <a:rPr lang="bg-BG" sz="3600" dirty="0"/>
               <a:t>Най-лоша, средноаретмична и най-добра</a:t>
             </a:r>
             <a:r>
-              <a:rPr lang="en-US" sz="3200" dirty="0"/>
+              <a:rPr lang="en-US" sz="3600" dirty="0"/>
               <a:t> </a:t>
             </a:r>
             <a:r>
-              <a:rPr lang="bg-BG" sz="3200" dirty="0"/>
+              <a:rPr lang="bg-BG" sz="3600" dirty="0"/>
               <a:t>производителност</a:t>
             </a:r>
             <a:r>
-              <a:rPr lang="en-US" sz="3200" dirty="0"/>
+              <a:rPr lang="en-US" sz="3600" dirty="0"/>
               <a:t>: </a:t>
             </a:r>
             <a:r>
-              <a:rPr lang="en-US" sz="3200" b="1" dirty="0">
+              <a:rPr lang="en-US" sz="3600" b="1" dirty="0">
                 <a:solidFill>
                   <a:schemeClr val="bg1"/>
                 </a:solidFill>
@@ -19344,11 +19144,11 @@
           </a:p>
           <a:p>
             <a:r>
-              <a:rPr lang="bg-BG" sz="3200" dirty="0"/>
+              <a:rPr lang="bg-BG" sz="3600" dirty="0"/>
               <a:t>Можете да видите </a:t>
             </a:r>
             <a:r>
-              <a:rPr lang="bg-BG" sz="3200" b="1" dirty="0">
+              <a:rPr lang="bg-BG" sz="3600" b="1" dirty="0">
                 <a:solidFill>
                   <a:schemeClr val="bg1"/>
                 </a:solidFill>
@@ -19362,14 +19162,14 @@
               </a:rPr>
               <a:t>визуализацията</a:t>
             </a:r>
-            <a:endParaRPr lang="en-US" sz="3200" b="1" dirty="0">
+            <a:endParaRPr lang="en-US" sz="3600" b="1" dirty="0">
               <a:solidFill>
                 <a:schemeClr val="bg1"/>
               </a:solidFill>
             </a:endParaRPr>
           </a:p>
           <a:p>
-            <a:endParaRPr lang="en-US" sz="3200" b="1" dirty="0">
+            <a:endParaRPr lang="en-US" sz="3600" b="1" dirty="0">
               <a:solidFill>
                 <a:schemeClr val="bg1"/>
               </a:solidFill>
@@ -19388,12 +19188,7 @@
             <p:ph type="title"/>
           </p:nvPr>
         </p:nvSpPr>
-        <p:spPr>
-          <a:xfrm>
-            <a:off x="191944" y="101617"/>
-            <a:ext cx="9713064" cy="882424"/>
-          </a:xfrm>
-        </p:spPr>
+        <p:spPr/>
         <p:txBody>
           <a:bodyPr/>
           <a:lstStyle/>
@@ -19403,48 +19198,6 @@
               <a:t>Линейно търсене</a:t>
             </a:r>
             <a:endParaRPr lang="en-US" dirty="0"/>
-          </a:p>
-        </p:txBody>
-      </p:sp>
-      <p:sp>
-        <p:nvSpPr>
-          <p:cNvPr id="6" name="Slide Number">
-            <a:extLst>
-              <a:ext uri="{FF2B5EF4-FFF2-40B4-BE49-F238E27FC236}">
-                <a16:creationId xmlns:a16="http://schemas.microsoft.com/office/drawing/2014/main" id="{B64C7563-70FE-445C-8EFD-87FD023BDA94}"/>
-              </a:ext>
-            </a:extLst>
-          </p:cNvPr>
-          <p:cNvSpPr>
-            <a:spLocks noGrp="1"/>
-          </p:cNvSpPr>
-          <p:nvPr>
-            <p:ph type="sldNum" sz="quarter" idx="5"/>
-          </p:nvPr>
-        </p:nvSpPr>
-        <p:spPr>
-          <a:xfrm>
-            <a:off x="11753030" y="6507000"/>
-            <a:ext cx="367414" cy="297000"/>
-          </a:xfrm>
-          <a:prstGeom prst="rect">
-            <a:avLst/>
-          </a:prstGeom>
-        </p:spPr>
-        <p:txBody>
-          <a:bodyPr vert="horz" lIns="91440" tIns="45720" rIns="91440" bIns="45720" rtlCol="0" anchor="b"/>
-          <a:lstStyle>
-            <a:lvl1pPr algn="r">
-              <a:defRPr sz="1000"/>
-            </a:lvl1pPr>
-          </a:lstStyle>
-          <a:p>
-            <a:fld id="{2BF067CD-8E6B-4360-9AA8-C5DF2A48A6D1}" type="slidenum">
-              <a:rPr lang="en-US" noProof="0" smtClean="0"/>
-              <a:pPr/>
-              <a:t>25</a:t>
-            </a:fld>
-            <a:endParaRPr lang="en-US" noProof="0" dirty="0"/>
           </a:p>
         </p:txBody>
       </p:sp>
@@ -19502,7 +19255,7 @@
                                         <p:tgtEl>
                                           <p:spTgt spid="2">
                                             <p:txEl>
-                                              <p:pRg st="1" end="1"/>
+                                              <p:pRg st="2" end="2"/>
                                             </p:txEl>
                                           </p:spTgt>
                                         </p:tgtEl>
@@ -19551,7 +19304,7 @@
                                         <p:tgtEl>
                                           <p:spTgt spid="2">
                                             <p:txEl>
-                                              <p:pRg st="2" end="2"/>
+                                              <p:pRg st="3" end="3"/>
                                             </p:txEl>
                                           </p:spTgt>
                                         </p:tgtEl>
@@ -19593,55 +19346,6 @@
                                     <p:set>
                                       <p:cBhvr>
                                         <p:cTn id="14" dur="1" fill="hold">
-                                          <p:stCondLst>
-                                            <p:cond delay="0"/>
-                                          </p:stCondLst>
-                                        </p:cTn>
-                                        <p:tgtEl>
-                                          <p:spTgt spid="2">
-                                            <p:txEl>
-                                              <p:pRg st="3" end="3"/>
-                                            </p:txEl>
-                                          </p:spTgt>
-                                        </p:tgtEl>
-                                        <p:attrNameLst>
-                                          <p:attrName>style.visibility</p:attrName>
-                                        </p:attrNameLst>
-                                      </p:cBhvr>
-                                      <p:to>
-                                        <p:strVal val="visible"/>
-                                      </p:to>
-                                    </p:set>
-                                  </p:childTnLst>
-                                </p:cTn>
-                              </p:par>
-                            </p:childTnLst>
-                          </p:cTn>
-                        </p:par>
-                      </p:childTnLst>
-                    </p:cTn>
-                  </p:par>
-                  <p:par>
-                    <p:cTn id="15" fill="hold">
-                      <p:stCondLst>
-                        <p:cond delay="indefinite"/>
-                      </p:stCondLst>
-                      <p:childTnLst>
-                        <p:par>
-                          <p:cTn id="16" fill="hold">
-                            <p:stCondLst>
-                              <p:cond delay="0"/>
-                            </p:stCondLst>
-                            <p:childTnLst>
-                              <p:par>
-                                <p:cTn id="17" presetID="1" presetClass="entr" presetSubtype="0" fill="hold" nodeType="clickEffect">
-                                  <p:stCondLst>
-                                    <p:cond delay="0"/>
-                                  </p:stCondLst>
-                                  <p:childTnLst>
-                                    <p:set>
-                                      <p:cBhvr>
-                                        <p:cTn id="18" dur="1" fill="hold">
                                           <p:stCondLst>
                                             <p:cond delay="0"/>
                                           </p:stCondLst>
@@ -19765,15 +19469,7 @@
             </a:pPr>
             <a:r>
               <a:rPr lang="bg-BG" sz="3199" dirty="0"/>
-              <a:t>При всяка стъпка</a:t>
-            </a:r>
-            <a:r>
-              <a:rPr lang="en-US" sz="3199" dirty="0"/>
-              <a:t>,</a:t>
-            </a:r>
-            <a:r>
-              <a:rPr lang="bg-BG" sz="3199" dirty="0"/>
-              <a:t> </a:t>
+              <a:t>При всяка стъпка </a:t>
             </a:r>
             <a:r>
               <a:rPr lang="bg-BG" sz="3199" b="1" dirty="0">
@@ -19838,11 +19534,24 @@
             </a:r>
             <a:r>
               <a:rPr lang="bg-BG" b="1" dirty="0">
-                <a:hlinkClick r:id="rId2"/>
+                <a:solidFill>
+                  <a:schemeClr val="bg1"/>
+                </a:solidFill>
+                <a:hlinkClick r:id="rId2">
+                  <a:extLst>
+                    <a:ext uri="{A12FA001-AC4F-418D-AE19-62706E023703}">
+                      <ahyp:hlinkClr xmlns:ahyp="http://schemas.microsoft.com/office/drawing/2018/hyperlinkcolor" val="tx"/>
+                    </a:ext>
+                  </a:extLst>
+                </a:hlinkClick>
               </a:rPr>
               <a:t>визуализацията</a:t>
             </a:r>
-            <a:endParaRPr lang="en-US" dirty="0"/>
+            <a:endParaRPr lang="en-US" dirty="0">
+              <a:solidFill>
+                <a:schemeClr val="bg1"/>
+              </a:solidFill>
+            </a:endParaRPr>
           </a:p>
         </p:txBody>
       </p:sp>
@@ -20150,7 +19859,7 @@
                                         <p:tgtEl>
                                           <p:spTgt spid="2">
                                             <p:txEl>
-                                              <p:pRg st="2" end="2"/>
+                                              <p:pRg st="3" end="3"/>
                                             </p:txEl>
                                           </p:spTgt>
                                         </p:tgtEl>
@@ -20192,55 +19901,6 @@
                                     <p:set>
                                       <p:cBhvr>
                                         <p:cTn id="14" dur="1" fill="hold">
-                                          <p:stCondLst>
-                                            <p:cond delay="0"/>
-                                          </p:stCondLst>
-                                        </p:cTn>
-                                        <p:tgtEl>
-                                          <p:spTgt spid="2">
-                                            <p:txEl>
-                                              <p:pRg st="3" end="3"/>
-                                            </p:txEl>
-                                          </p:spTgt>
-                                        </p:tgtEl>
-                                        <p:attrNameLst>
-                                          <p:attrName>style.visibility</p:attrName>
-                                        </p:attrNameLst>
-                                      </p:cBhvr>
-                                      <p:to>
-                                        <p:strVal val="visible"/>
-                                      </p:to>
-                                    </p:set>
-                                  </p:childTnLst>
-                                </p:cTn>
-                              </p:par>
-                            </p:childTnLst>
-                          </p:cTn>
-                        </p:par>
-                      </p:childTnLst>
-                    </p:cTn>
-                  </p:par>
-                  <p:par>
-                    <p:cTn id="15" fill="hold">
-                      <p:stCondLst>
-                        <p:cond delay="indefinite"/>
-                      </p:stCondLst>
-                      <p:childTnLst>
-                        <p:par>
-                          <p:cTn id="16" fill="hold">
-                            <p:stCondLst>
-                              <p:cond delay="0"/>
-                            </p:stCondLst>
-                            <p:childTnLst>
-                              <p:par>
-                                <p:cTn id="17" presetID="1" presetClass="entr" presetSubtype="0" fill="hold" nodeType="clickEffect">
-                                  <p:stCondLst>
-                                    <p:cond delay="0"/>
-                                  </p:stCondLst>
-                                  <p:childTnLst>
-                                    <p:set>
-                                      <p:cBhvr>
-                                        <p:cTn id="18" dur="1" fill="hold">
                                           <p:stCondLst>
                                             <p:cond delay="0"/>
                                           </p:stCondLst>
@@ -20340,11 +20000,19 @@
             </a:r>
             <a:r>
               <a:rPr lang="en-US" dirty="0"/>
-              <a:t>): </a:t>
+              <a:t>)</a:t>
             </a:r>
             <a:r>
               <a:rPr lang="bg-BG" dirty="0"/>
-              <a:t>код</a:t>
+              <a:t> –</a:t>
+            </a:r>
+            <a:r>
+              <a:rPr lang="en-US" dirty="0"/>
+              <a:t> </a:t>
+            </a:r>
+            <a:r>
+              <a:rPr lang="bg-BG" dirty="0"/>
+              <a:t>Код</a:t>
             </a:r>
             <a:endParaRPr lang="en-US" dirty="0"/>
           </a:p>
@@ -21286,7 +20954,7 @@
         <p:spPr>
           <a:xfrm>
             <a:off x="1638028" y="982929"/>
-            <a:ext cx="10298815" cy="5376909"/>
+            <a:ext cx="10298815" cy="5641071"/>
           </a:xfrm>
         </p:spPr>
         <p:txBody>
@@ -21342,7 +21010,27 @@
             </a:r>
             <a:r>
               <a:rPr lang="bg-BG" sz="3399" dirty="0"/>
-              <a:t>алгоритъм за търсене на даден ключ в подреден индексиран масив</a:t>
+              <a:t>алгоритъм за търсене на даден </a:t>
+            </a:r>
+            <a:r>
+              <a:rPr lang="bg-BG" sz="3399" b="1" dirty="0">
+                <a:solidFill>
+                  <a:schemeClr val="bg1"/>
+                </a:solidFill>
+              </a:rPr>
+              <a:t>ключ</a:t>
+            </a:r>
+            <a:r>
+              <a:rPr lang="bg-BG" sz="3399" dirty="0"/>
+              <a:t> в </a:t>
+            </a:r>
+            <a:r>
+              <a:rPr lang="bg-BG" sz="3399" b="1" dirty="0">
+                <a:solidFill>
+                  <a:schemeClr val="bg1"/>
+                </a:solidFill>
+              </a:rPr>
+              <a:t>подреден индексиран масив</a:t>
             </a:r>
             <a:endParaRPr lang="en-US" sz="3399" b="1" dirty="0">
               <a:solidFill>
@@ -21357,10 +21045,10 @@
               </a:lnSpc>
             </a:pPr>
             <a:r>
-              <a:rPr lang="bg-BG" sz="2799" dirty="0"/>
+              <a:rPr lang="bg-BG" sz="3100" dirty="0"/>
               <a:t>Подобно на начина, по който хората търсят в телефонния указател</a:t>
             </a:r>
-            <a:endParaRPr lang="en-US" sz="2799" dirty="0"/>
+            <a:endParaRPr lang="en-US" sz="3100" dirty="0"/>
           </a:p>
           <a:p>
             <a:pPr lvl="1">
@@ -21369,7 +21057,7 @@
               </a:lnSpc>
             </a:pPr>
             <a:r>
-              <a:rPr lang="ru-RU" sz="2799" dirty="0"/>
+              <a:rPr lang="ru-RU" sz="3100" dirty="0"/>
               <a:t>Изчислява къде може да се намира елементът в оставащото пространство </a:t>
             </a:r>
           </a:p>
@@ -21380,18 +21068,18 @@
               </a:lnSpc>
             </a:pPr>
             <a:r>
-              <a:rPr lang="bg-BG" sz="2799" dirty="0"/>
+              <a:rPr lang="bg-BG" sz="3100" dirty="0"/>
               <a:t>Двоичното търсене винаги избира </a:t>
             </a:r>
             <a:r>
-              <a:rPr lang="bg-BG" sz="2799" b="1" dirty="0">
+              <a:rPr lang="bg-BG" sz="3100" b="1" dirty="0">
                 <a:solidFill>
                   <a:schemeClr val="bg1"/>
                 </a:solidFill>
               </a:rPr>
               <a:t>средния елемент</a:t>
             </a:r>
-            <a:endParaRPr lang="en-US" sz="2799" b="1" dirty="0">
+            <a:endParaRPr lang="en-US" sz="3100" b="1" dirty="0">
               <a:solidFill>
                 <a:schemeClr val="bg1"/>
               </a:solidFill>
@@ -21459,11 +21147,24 @@
             </a:r>
             <a:r>
               <a:rPr lang="bg-BG" b="1" dirty="0">
-                <a:hlinkClick r:id="rId2"/>
+                <a:solidFill>
+                  <a:schemeClr val="bg1"/>
+                </a:solidFill>
+                <a:hlinkClick r:id="rId2">
+                  <a:extLst>
+                    <a:ext uri="{A12FA001-AC4F-418D-AE19-62706E023703}">
+                      <ahyp:hlinkClr xmlns:ahyp="http://schemas.microsoft.com/office/drawing/2018/hyperlinkcolor" val="tx"/>
+                    </a:ext>
+                  </a:extLst>
+                </a:hlinkClick>
               </a:rPr>
               <a:t>визуализацията</a:t>
             </a:r>
-            <a:endParaRPr lang="en-US" dirty="0"/>
+            <a:endParaRPr lang="en-US" dirty="0">
+              <a:solidFill>
+                <a:schemeClr val="bg1"/>
+              </a:solidFill>
+            </a:endParaRPr>
           </a:p>
         </p:txBody>
       </p:sp>
@@ -21611,7 +21312,7 @@
                                         <p:tgtEl>
                                           <p:spTgt spid="3">
                                             <p:txEl>
-                                              <p:pRg st="1" end="1"/>
+                                              <p:pRg st="2" end="2"/>
                                             </p:txEl>
                                           </p:spTgt>
                                         </p:tgtEl>
@@ -21660,7 +21361,7 @@
                                         <p:tgtEl>
                                           <p:spTgt spid="3">
                                             <p:txEl>
-                                              <p:pRg st="2" end="2"/>
+                                              <p:pRg st="3" end="3"/>
                                             </p:txEl>
                                           </p:spTgt>
                                         </p:tgtEl>
@@ -21709,7 +21410,7 @@
                                         <p:tgtEl>
                                           <p:spTgt spid="3">
                                             <p:txEl>
-                                              <p:pRg st="3" end="3"/>
+                                              <p:pRg st="4" end="4"/>
                                             </p:txEl>
                                           </p:spTgt>
                                         </p:tgtEl>
@@ -21758,7 +21459,7 @@
                                         <p:tgtEl>
                                           <p:spTgt spid="3">
                                             <p:txEl>
-                                              <p:pRg st="4" end="4"/>
+                                              <p:pRg st="5" end="5"/>
                                             </p:txEl>
                                           </p:spTgt>
                                         </p:tgtEl>
@@ -21800,55 +21501,6 @@
                                     <p:set>
                                       <p:cBhvr>
                                         <p:cTn id="22" dur="1" fill="hold">
-                                          <p:stCondLst>
-                                            <p:cond delay="0"/>
-                                          </p:stCondLst>
-                                        </p:cTn>
-                                        <p:tgtEl>
-                                          <p:spTgt spid="3">
-                                            <p:txEl>
-                                              <p:pRg st="5" end="5"/>
-                                            </p:txEl>
-                                          </p:spTgt>
-                                        </p:tgtEl>
-                                        <p:attrNameLst>
-                                          <p:attrName>style.visibility</p:attrName>
-                                        </p:attrNameLst>
-                                      </p:cBhvr>
-                                      <p:to>
-                                        <p:strVal val="visible"/>
-                                      </p:to>
-                                    </p:set>
-                                  </p:childTnLst>
-                                </p:cTn>
-                              </p:par>
-                            </p:childTnLst>
-                          </p:cTn>
-                        </p:par>
-                      </p:childTnLst>
-                    </p:cTn>
-                  </p:par>
-                  <p:par>
-                    <p:cTn id="23" fill="hold">
-                      <p:stCondLst>
-                        <p:cond delay="indefinite"/>
-                      </p:stCondLst>
-                      <p:childTnLst>
-                        <p:par>
-                          <p:cTn id="24" fill="hold">
-                            <p:stCondLst>
-                              <p:cond delay="0"/>
-                            </p:stCondLst>
-                            <p:childTnLst>
-                              <p:par>
-                                <p:cTn id="25" presetID="1" presetClass="entr" presetSubtype="0" fill="hold" nodeType="clickEffect">
-                                  <p:stCondLst>
-                                    <p:cond delay="0"/>
-                                  </p:stCondLst>
-                                  <p:childTnLst>
-                                    <p:set>
-                                      <p:cBhvr>
-                                        <p:cTn id="26" dur="1" fill="hold">
                                           <p:stCondLst>
                                             <p:cond delay="0"/>
                                           </p:stCondLst>
@@ -21944,15 +21596,15 @@
           <a:p>
             <a:r>
               <a:rPr lang="bg-BG" sz="3999" dirty="0"/>
-              <a:t>Интерполационно търсене</a:t>
+              <a:t>Интерполационно Търсене –</a:t>
             </a:r>
             <a:r>
               <a:rPr lang="en-US" sz="3999" dirty="0"/>
-              <a:t>: </a:t>
+              <a:t> </a:t>
             </a:r>
             <a:r>
               <a:rPr lang="bg-BG" sz="3999" dirty="0"/>
-              <a:t>код</a:t>
+              <a:t>Код</a:t>
             </a:r>
             <a:endParaRPr lang="en-US" dirty="0"/>
           </a:p>
@@ -23172,7 +22824,12 @@
             <p:ph type="title" sz="quarter" idx="10"/>
           </p:nvPr>
         </p:nvSpPr>
-        <p:spPr/>
+        <p:spPr>
+          <a:xfrm>
+            <a:off x="615109" y="4775916"/>
+            <a:ext cx="10961783" cy="768084"/>
+          </a:xfrm>
+        </p:spPr>
         <p:txBody>
           <a:bodyPr/>
           <a:lstStyle/>
@@ -25246,11 +24903,19 @@
             </a:r>
             <a:r>
               <a:rPr lang="en-US" dirty="0"/>
-              <a:t>Fisher–Yates Shuffle: </a:t>
+              <a:t>Fisher–Yates Shuffle</a:t>
             </a:r>
             <a:r>
               <a:rPr lang="bg-BG" dirty="0"/>
-              <a:t>код</a:t>
+              <a:t> –</a:t>
+            </a:r>
+            <a:r>
+              <a:rPr lang="en-US" dirty="0"/>
+              <a:t> </a:t>
+            </a:r>
+            <a:r>
+              <a:rPr lang="bg-BG" dirty="0"/>
+              <a:t>Код</a:t>
             </a:r>
             <a:endParaRPr lang="en-US" dirty="0"/>
           </a:p>
@@ -26539,7 +26204,38 @@
                                         <p:tgtEl>
                                           <p:spTgt spid="14">
                                             <p:txEl>
-                                              <p:pRg st="1" end="1"/>
+                                              <p:pRg st="2" end="2"/>
+                                            </p:txEl>
+                                          </p:spTgt>
+                                        </p:tgtEl>
+                                        <p:attrNameLst>
+                                          <p:attrName>style.visibility</p:attrName>
+                                        </p:attrNameLst>
+                                      </p:cBhvr>
+                                      <p:to>
+                                        <p:strVal val="visible"/>
+                                      </p:to>
+                                    </p:set>
+                                  </p:childTnLst>
+                                </p:cTn>
+                              </p:par>
+                              <p:par>
+                                <p:cTn id="7" presetID="1" presetClass="entr" presetSubtype="0" fill="hold" nodeType="withEffect">
+                                  <p:stCondLst>
+                                    <p:cond delay="0"/>
+                                  </p:stCondLst>
+                                  <p:childTnLst>
+                                    <p:set>
+                                      <p:cBhvr>
+                                        <p:cTn id="8" dur="1" fill="hold">
+                                          <p:stCondLst>
+                                            <p:cond delay="0"/>
+                                          </p:stCondLst>
+                                        </p:cTn>
+                                        <p:tgtEl>
+                                          <p:spTgt spid="14">
+                                            <p:txEl>
+                                              <p:pRg st="3" end="3"/>
                                             </p:txEl>
                                           </p:spTgt>
                                         </p:tgtEl>
@@ -26561,26 +26257,26 @@
                     </p:cTn>
                   </p:par>
                   <p:par>
-                    <p:cTn id="7" fill="hold">
+                    <p:cTn id="9" fill="hold">
                       <p:stCondLst>
                         <p:cond delay="indefinite"/>
                       </p:stCondLst>
                       <p:childTnLst>
                         <p:par>
-                          <p:cTn id="8" fill="hold">
+                          <p:cTn id="10" fill="hold">
                             <p:stCondLst>
                               <p:cond delay="0"/>
                             </p:stCondLst>
                             <p:childTnLst>
                               <p:par>
-                                <p:cTn id="9" presetID="1" presetClass="entr" presetSubtype="0" fill="hold" nodeType="clickEffect">
+                                <p:cTn id="11" presetID="1" presetClass="entr" presetSubtype="0" fill="hold" nodeType="clickEffect">
                                   <p:stCondLst>
                                     <p:cond delay="0"/>
                                   </p:stCondLst>
                                   <p:childTnLst>
                                     <p:set>
                                       <p:cBhvr>
-                                        <p:cTn id="10" dur="1" fill="hold">
+                                        <p:cTn id="12" dur="1" fill="hold">
                                           <p:stCondLst>
                                             <p:cond delay="0"/>
                                           </p:stCondLst>
@@ -26588,7 +26284,7 @@
                                         <p:tgtEl>
                                           <p:spTgt spid="14">
                                             <p:txEl>
-                                              <p:pRg st="2" end="2"/>
+                                              <p:pRg st="4" end="4"/>
                                             </p:txEl>
                                           </p:spTgt>
                                         </p:tgtEl>
@@ -26603,26 +26299,8 @@
                                   </p:childTnLst>
                                 </p:cTn>
                               </p:par>
-                            </p:childTnLst>
-                          </p:cTn>
-                        </p:par>
-                      </p:childTnLst>
-                    </p:cTn>
-                  </p:par>
-                  <p:par>
-                    <p:cTn id="11" fill="hold">
-                      <p:stCondLst>
-                        <p:cond delay="indefinite"/>
-                      </p:stCondLst>
-                      <p:childTnLst>
-                        <p:par>
-                          <p:cTn id="12" fill="hold">
-                            <p:stCondLst>
-                              <p:cond delay="0"/>
-                            </p:stCondLst>
-                            <p:childTnLst>
                               <p:par>
-                                <p:cTn id="13" presetID="1" presetClass="entr" presetSubtype="0" fill="hold" nodeType="clickEffect">
+                                <p:cTn id="13" presetID="1" presetClass="entr" presetSubtype="0" fill="hold" nodeType="withEffect">
                                   <p:stCondLst>
                                     <p:cond delay="0"/>
                                   </p:stCondLst>
@@ -26637,7 +26315,7 @@
                                         <p:tgtEl>
                                           <p:spTgt spid="14">
                                             <p:txEl>
-                                              <p:pRg st="3" end="3"/>
+                                              <p:pRg st="5" end="5"/>
                                             </p:txEl>
                                           </p:spTgt>
                                         </p:tgtEl>
@@ -26686,7 +26364,7 @@
                                         <p:tgtEl>
                                           <p:spTgt spid="14">
                                             <p:txEl>
-                                              <p:pRg st="4" end="4"/>
+                                              <p:pRg st="6" end="6"/>
                                             </p:txEl>
                                           </p:spTgt>
                                         </p:tgtEl>
@@ -26735,104 +26413,6 @@
                                         <p:tgtEl>
                                           <p:spTgt spid="14">
                                             <p:txEl>
-                                              <p:pRg st="5" end="5"/>
-                                            </p:txEl>
-                                          </p:spTgt>
-                                        </p:tgtEl>
-                                        <p:attrNameLst>
-                                          <p:attrName>style.visibility</p:attrName>
-                                        </p:attrNameLst>
-                                      </p:cBhvr>
-                                      <p:to>
-                                        <p:strVal val="visible"/>
-                                      </p:to>
-                                    </p:set>
-                                  </p:childTnLst>
-                                </p:cTn>
-                              </p:par>
-                            </p:childTnLst>
-                          </p:cTn>
-                        </p:par>
-                      </p:childTnLst>
-                    </p:cTn>
-                  </p:par>
-                  <p:par>
-                    <p:cTn id="23" fill="hold">
-                      <p:stCondLst>
-                        <p:cond delay="indefinite"/>
-                      </p:stCondLst>
-                      <p:childTnLst>
-                        <p:par>
-                          <p:cTn id="24" fill="hold">
-                            <p:stCondLst>
-                              <p:cond delay="0"/>
-                            </p:stCondLst>
-                            <p:childTnLst>
-                              <p:par>
-                                <p:cTn id="25" presetID="1" presetClass="entr" presetSubtype="0" fill="hold" nodeType="clickEffect">
-                                  <p:stCondLst>
-                                    <p:cond delay="0"/>
-                                  </p:stCondLst>
-                                  <p:childTnLst>
-                                    <p:set>
-                                      <p:cBhvr>
-                                        <p:cTn id="26" dur="1" fill="hold">
-                                          <p:stCondLst>
-                                            <p:cond delay="0"/>
-                                          </p:stCondLst>
-                                        </p:cTn>
-                                        <p:tgtEl>
-                                          <p:spTgt spid="14">
-                                            <p:txEl>
-                                              <p:pRg st="6" end="6"/>
-                                            </p:txEl>
-                                          </p:spTgt>
-                                        </p:tgtEl>
-                                        <p:attrNameLst>
-                                          <p:attrName>style.visibility</p:attrName>
-                                        </p:attrNameLst>
-                                      </p:cBhvr>
-                                      <p:to>
-                                        <p:strVal val="visible"/>
-                                      </p:to>
-                                    </p:set>
-                                  </p:childTnLst>
-                                </p:cTn>
-                              </p:par>
-                            </p:childTnLst>
-                          </p:cTn>
-                        </p:par>
-                      </p:childTnLst>
-                    </p:cTn>
-                  </p:par>
-                  <p:par>
-                    <p:cTn id="27" fill="hold">
-                      <p:stCondLst>
-                        <p:cond delay="indefinite"/>
-                      </p:stCondLst>
-                      <p:childTnLst>
-                        <p:par>
-                          <p:cTn id="28" fill="hold">
-                            <p:stCondLst>
-                              <p:cond delay="0"/>
-                            </p:stCondLst>
-                            <p:childTnLst>
-                              <p:par>
-                                <p:cTn id="29" presetID="1" presetClass="entr" presetSubtype="0" fill="hold" nodeType="clickEffect">
-                                  <p:stCondLst>
-                                    <p:cond delay="0"/>
-                                  </p:stCondLst>
-                                  <p:childTnLst>
-                                    <p:set>
-                                      <p:cBhvr>
-                                        <p:cTn id="30" dur="1" fill="hold">
-                                          <p:stCondLst>
-                                            <p:cond delay="0"/>
-                                          </p:stCondLst>
-                                        </p:cTn>
-                                        <p:tgtEl>
-                                          <p:spTgt spid="14">
-                                            <p:txEl>
                                               <p:pRg st="7" end="7"/>
                                             </p:txEl>
                                           </p:spTgt>
@@ -26848,33 +26428,15 @@
                                   </p:childTnLst>
                                 </p:cTn>
                               </p:par>
-                            </p:childTnLst>
-                          </p:cTn>
-                        </p:par>
-                      </p:childTnLst>
-                    </p:cTn>
-                  </p:par>
-                  <p:par>
-                    <p:cTn id="31" fill="hold">
-                      <p:stCondLst>
-                        <p:cond delay="indefinite"/>
-                      </p:stCondLst>
-                      <p:childTnLst>
-                        <p:par>
-                          <p:cTn id="32" fill="hold">
-                            <p:stCondLst>
-                              <p:cond delay="0"/>
-                            </p:stCondLst>
-                            <p:childTnLst>
                               <p:par>
-                                <p:cTn id="33" presetID="1" presetClass="entr" presetSubtype="0" fill="hold" nodeType="clickEffect">
+                                <p:cTn id="23" presetID="1" presetClass="entr" presetSubtype="0" fill="hold" nodeType="withEffect">
                                   <p:stCondLst>
                                     <p:cond delay="0"/>
                                   </p:stCondLst>
                                   <p:childTnLst>
                                     <p:set>
                                       <p:cBhvr>
-                                        <p:cTn id="34" dur="1" fill="hold">
+                                        <p:cTn id="24" dur="1" fill="hold">
                                           <p:stCondLst>
                                             <p:cond delay="0"/>
                                           </p:stCondLst>
@@ -26904,26 +26466,26 @@
                     </p:cTn>
                   </p:par>
                   <p:par>
-                    <p:cTn id="35" fill="hold">
+                    <p:cTn id="25" fill="hold">
                       <p:stCondLst>
                         <p:cond delay="indefinite"/>
                       </p:stCondLst>
                       <p:childTnLst>
                         <p:par>
-                          <p:cTn id="36" fill="hold">
+                          <p:cTn id="26" fill="hold">
                             <p:stCondLst>
                               <p:cond delay="0"/>
                             </p:stCondLst>
                             <p:childTnLst>
                               <p:par>
-                                <p:cTn id="37" presetID="1" presetClass="entr" presetSubtype="0" fill="hold" nodeType="clickEffect">
+                                <p:cTn id="27" presetID="1" presetClass="entr" presetSubtype="0" fill="hold" nodeType="clickEffect">
                                   <p:stCondLst>
                                     <p:cond delay="0"/>
                                   </p:stCondLst>
                                   <p:childTnLst>
                                     <p:set>
                                       <p:cBhvr>
-                                        <p:cTn id="38" dur="1" fill="hold">
+                                        <p:cTn id="28" dur="1" fill="hold">
                                           <p:stCondLst>
                                             <p:cond delay="0"/>
                                           </p:stCondLst>
@@ -27373,7 +26935,7 @@
           <a:p>
             <a:r>
               <a:rPr lang="bg-BG" dirty="0"/>
-              <a:t>Какво е алгоритъм за сортиране</a:t>
+              <a:t>Какво е сортиращ алгоритъм</a:t>
             </a:r>
             <a:r>
               <a:rPr lang="en-US" dirty="0"/>
@@ -27408,45 +26970,22 @@
               <a:lnSpc>
                 <a:spcPct val="100000"/>
               </a:lnSpc>
-              <a:buClr>
-                <a:schemeClr val="tx1"/>
-              </a:buClr>
             </a:pPr>
             <a:r>
+              <a:rPr lang="bg-BG" dirty="0"/>
+              <a:t>Алгоритъм, който </a:t>
+            </a:r>
+            <a:r>
               <a:rPr lang="bg-BG" b="1" dirty="0">
                 <a:solidFill>
                   <a:schemeClr val="bg1"/>
                 </a:solidFill>
               </a:rPr>
-              <a:t>Сортиращ алгоритъм</a:t>
-            </a:r>
-            <a:endParaRPr lang="en-US" b="1" dirty="0">
-              <a:solidFill>
-                <a:schemeClr val="bg1"/>
-              </a:solidFill>
-            </a:endParaRPr>
-          </a:p>
-          <a:p>
-            <a:pPr lvl="1">
-              <a:lnSpc>
-                <a:spcPct val="100000"/>
-              </a:lnSpc>
-            </a:pPr>
+              <a:t>пренарежда елементите </a:t>
+            </a:r>
             <a:r>
               <a:rPr lang="bg-BG" dirty="0"/>
-              <a:t>Алгоритъм, който пренарежда елементите в списък</a:t>
-            </a:r>
-            <a:endParaRPr lang="en-US" dirty="0"/>
-          </a:p>
-          <a:p>
-            <a:pPr lvl="2">
-              <a:lnSpc>
-                <a:spcPct val="100000"/>
-              </a:lnSpc>
-            </a:pPr>
-            <a:r>
-              <a:rPr lang="bg-BG" dirty="0"/>
-              <a:t>В </a:t>
+              <a:t>в списък в </a:t>
             </a:r>
             <a:r>
               <a:rPr lang="bg-BG" b="1" dirty="0">
@@ -27454,35 +26993,9 @@
                   <a:schemeClr val="bg1"/>
                 </a:solidFill>
               </a:rPr>
-              <a:t>нарастващ</a:t>
-            </a:r>
-            <a:r>
-              <a:rPr lang="bg-BG" dirty="0"/>
-              <a:t> ред</a:t>
-            </a:r>
-          </a:p>
-          <a:p>
-            <a:pPr lvl="2">
-              <a:lnSpc>
-                <a:spcPct val="100000"/>
-              </a:lnSpc>
-            </a:pPr>
-            <a:r>
-              <a:rPr lang="bg-BG" dirty="0"/>
-              <a:t>Елементите трябва да могат да се</a:t>
-            </a:r>
-            <a:br>
-              <a:rPr lang="bg-BG" dirty="0"/>
-            </a:br>
-            <a:r>
-              <a:rPr lang="bg-BG" b="1" dirty="0">
-                <a:solidFill>
-                  <a:schemeClr val="bg1"/>
-                </a:solidFill>
-              </a:rPr>
-              <a:t>сравняват</a:t>
-            </a:r>
-            <a:endParaRPr lang="en-US" b="1" dirty="0">
+              <a:t>нарастващ ред</a:t>
+            </a:r>
+            <a:endParaRPr lang="en-US" dirty="0">
               <a:solidFill>
                 <a:schemeClr val="bg1"/>
               </a:solidFill>
@@ -27623,8 +27136,8 @@
         </p:blipFill>
         <p:spPr bwMode="auto">
           <a:xfrm>
-            <a:off x="8595662" y="2591019"/>
-            <a:ext cx="2971026" cy="2178754"/>
+            <a:off x="6726000" y="4420350"/>
+            <a:ext cx="3180000" cy="2332002"/>
           </a:xfrm>
           <a:prstGeom prst="rect">
             <a:avLst/>
@@ -27752,33 +27265,15 @@
                                   </p:childTnLst>
                                 </p:cTn>
                               </p:par>
-                            </p:childTnLst>
-                          </p:cTn>
-                        </p:par>
-                      </p:childTnLst>
-                    </p:cTn>
-                  </p:par>
-                  <p:par>
-                    <p:cTn id="7" fill="hold">
-                      <p:stCondLst>
-                        <p:cond delay="indefinite"/>
-                      </p:stCondLst>
-                      <p:childTnLst>
-                        <p:par>
-                          <p:cTn id="8" fill="hold">
-                            <p:stCondLst>
-                              <p:cond delay="0"/>
-                            </p:stCondLst>
-                            <p:childTnLst>
                               <p:par>
-                                <p:cTn id="9" presetID="1" presetClass="entr" presetSubtype="0" fill="hold" nodeType="clickEffect">
+                                <p:cTn id="7" presetID="1" presetClass="entr" presetSubtype="0" fill="hold" nodeType="withEffect">
                                   <p:stCondLst>
                                     <p:cond delay="0"/>
                                   </p:stCondLst>
                                   <p:childTnLst>
                                     <p:set>
                                       <p:cBhvr>
-                                        <p:cTn id="10" dur="1" fill="hold">
+                                        <p:cTn id="8" dur="1" fill="hold">
                                           <p:stCondLst>
                                             <p:cond delay="0"/>
                                           </p:stCondLst>
@@ -27808,26 +27303,26 @@
                     </p:cTn>
                   </p:par>
                   <p:par>
-                    <p:cTn id="11" fill="hold">
+                    <p:cTn id="9" fill="hold">
                       <p:stCondLst>
                         <p:cond delay="indefinite"/>
                       </p:stCondLst>
                       <p:childTnLst>
                         <p:par>
-                          <p:cTn id="12" fill="hold">
+                          <p:cTn id="10" fill="hold">
                             <p:stCondLst>
                               <p:cond delay="0"/>
                             </p:stCondLst>
                             <p:childTnLst>
                               <p:par>
-                                <p:cTn id="13" presetID="1" presetClass="entr" presetSubtype="0" fill="hold" nodeType="clickEffect">
+                                <p:cTn id="11" presetID="1" presetClass="entr" presetSubtype="0" fill="hold" nodeType="clickEffect">
                                   <p:stCondLst>
                                     <p:cond delay="0"/>
                                   </p:stCondLst>
                                   <p:childTnLst>
                                     <p:set>
                                       <p:cBhvr>
-                                        <p:cTn id="14" dur="1" fill="hold">
+                                        <p:cTn id="12" dur="1" fill="hold">
                                           <p:stCondLst>
                                             <p:cond delay="0"/>
                                           </p:stCondLst>
@@ -27836,153 +27331,6 @@
                                           <p:spTgt spid="3">
                                             <p:txEl>
                                               <p:pRg st="3" end="3"/>
-                                            </p:txEl>
-                                          </p:spTgt>
-                                        </p:tgtEl>
-                                        <p:attrNameLst>
-                                          <p:attrName>style.visibility</p:attrName>
-                                        </p:attrNameLst>
-                                      </p:cBhvr>
-                                      <p:to>
-                                        <p:strVal val="visible"/>
-                                      </p:to>
-                                    </p:set>
-                                  </p:childTnLst>
-                                </p:cTn>
-                              </p:par>
-                            </p:childTnLst>
-                          </p:cTn>
-                        </p:par>
-                      </p:childTnLst>
-                    </p:cTn>
-                  </p:par>
-                  <p:par>
-                    <p:cTn id="15" fill="hold">
-                      <p:stCondLst>
-                        <p:cond delay="indefinite"/>
-                      </p:stCondLst>
-                      <p:childTnLst>
-                        <p:par>
-                          <p:cTn id="16" fill="hold">
-                            <p:stCondLst>
-                              <p:cond delay="0"/>
-                            </p:stCondLst>
-                            <p:childTnLst>
-                              <p:par>
-                                <p:cTn id="17" presetID="1" presetClass="entr" presetSubtype="0" fill="hold" nodeType="clickEffect">
-                                  <p:stCondLst>
-                                    <p:cond delay="0"/>
-                                  </p:stCondLst>
-                                  <p:childTnLst>
-                                    <p:set>
-                                      <p:cBhvr>
-                                        <p:cTn id="18" dur="1" fill="hold">
-                                          <p:stCondLst>
-                                            <p:cond delay="0"/>
-                                          </p:stCondLst>
-                                        </p:cTn>
-                                        <p:tgtEl>
-                                          <p:spTgt spid="3">
-                                            <p:txEl>
-                                              <p:pRg st="4" end="4"/>
-                                            </p:txEl>
-                                          </p:spTgt>
-                                        </p:tgtEl>
-                                        <p:attrNameLst>
-                                          <p:attrName>style.visibility</p:attrName>
-                                        </p:attrNameLst>
-                                      </p:cBhvr>
-                                      <p:to>
-                                        <p:strVal val="visible"/>
-                                      </p:to>
-                                    </p:set>
-                                  </p:childTnLst>
-                                </p:cTn>
-                              </p:par>
-                            </p:childTnLst>
-                          </p:cTn>
-                        </p:par>
-                      </p:childTnLst>
-                    </p:cTn>
-                  </p:par>
-                  <p:par>
-                    <p:cTn id="19" fill="hold">
-                      <p:stCondLst>
-                        <p:cond delay="indefinite"/>
-                      </p:stCondLst>
-                      <p:childTnLst>
-                        <p:par>
-                          <p:cTn id="20" fill="hold">
-                            <p:stCondLst>
-                              <p:cond delay="0"/>
-                            </p:stCondLst>
-                            <p:childTnLst>
-                              <p:par>
-                                <p:cTn id="21" presetID="1" presetClass="entr" presetSubtype="0" fill="hold" nodeType="clickEffect">
-                                  <p:stCondLst>
-                                    <p:cond delay="0"/>
-                                  </p:stCondLst>
-                                  <p:childTnLst>
-                                    <p:set>
-                                      <p:cBhvr>
-                                        <p:cTn id="22" dur="1" fill="hold">
-                                          <p:stCondLst>
-                                            <p:cond delay="0"/>
-                                          </p:stCondLst>
-                                        </p:cTn>
-                                        <p:tgtEl>
-                                          <p:spTgt spid="3">
-                                            <p:txEl>
-                                              <p:pRg st="5" end="5"/>
-                                            </p:txEl>
-                                          </p:spTgt>
-                                        </p:tgtEl>
-                                        <p:attrNameLst>
-                                          <p:attrName>style.visibility</p:attrName>
-                                        </p:attrNameLst>
-                                      </p:cBhvr>
-                                      <p:to>
-                                        <p:strVal val="visible"/>
-                                      </p:to>
-                                    </p:set>
-                                  </p:childTnLst>
-                                </p:cTn>
-                              </p:par>
-                            </p:childTnLst>
-                          </p:cTn>
-                        </p:par>
-                      </p:childTnLst>
-                    </p:cTn>
-                  </p:par>
-                  <p:par>
-                    <p:cTn id="23" fill="hold">
-                      <p:stCondLst>
-                        <p:cond delay="indefinite"/>
-                      </p:stCondLst>
-                      <p:childTnLst>
-                        <p:par>
-                          <p:cTn id="24" fill="hold">
-                            <p:stCondLst>
-                              <p:cond delay="0"/>
-                            </p:stCondLst>
-                            <p:childTnLst>
-                              <p:par>
-                                <p:cTn id="25" presetID="1" presetClass="entr" presetSubtype="0" fill="hold" nodeType="clickEffect">
-                                  <p:stCondLst>
-                                    <p:cond delay="0"/>
-                                  </p:stCondLst>
-                                  <p:childTnLst>
-                                    <p:set>
-                                      <p:cBhvr>
-                                        <p:cTn id="26" dur="1" fill="hold">
-                                          <p:stCondLst>
-                                            <p:cond delay="0"/>
-                                          </p:stCondLst>
-                                        </p:cTn>
-                                        <p:tgtEl>
-                                          <p:spTgt spid="3">
-                                            <p:txEl>
-                                              <p:pRg st="6" end="6"/>
                                             </p:txEl>
                                           </p:spTgt>
                                         </p:tgtEl>
@@ -28062,7 +27410,7 @@
           <a:p>
             <a:r>
               <a:rPr lang="bg-BG" dirty="0"/>
-              <a:t>Сортиране:</a:t>
+              <a:t>Сортиране –</a:t>
             </a:r>
             <a:r>
               <a:rPr lang="en-US" dirty="0"/>
@@ -28070,7 +27418,7 @@
             </a:r>
             <a:r>
               <a:rPr lang="bg-BG" dirty="0"/>
-              <a:t>пример</a:t>
+              <a:t>Пример</a:t>
             </a:r>
             <a:endParaRPr lang="en-US" dirty="0"/>
           </a:p>
@@ -28167,7 +27515,7 @@
             </a:pPr>
             <a:r>
               <a:rPr lang="bg-BG" sz="3100" noProof="1"/>
-              <a:t>Канолизиране на данни </a:t>
+              <a:t>Стандартизиране на данни </a:t>
             </a:r>
             <a:r>
               <a:rPr lang="en-US" sz="3100" dirty="0"/>
@@ -29777,7 +29125,7 @@
                                         <p:tgtEl>
                                           <p:spTgt spid="3">
                                             <p:txEl>
-                                              <p:pRg st="1" end="1"/>
+                                              <p:pRg st="2" end="2"/>
                                             </p:txEl>
                                           </p:spTgt>
                                         </p:tgtEl>
@@ -29826,7 +29174,7 @@
                                         <p:tgtEl>
                                           <p:spTgt spid="3">
                                             <p:txEl>
-                                              <p:pRg st="2" end="2"/>
+                                              <p:pRg st="3" end="3"/>
                                             </p:txEl>
                                           </p:spTgt>
                                         </p:tgtEl>
@@ -29875,7 +29223,7 @@
                                         <p:tgtEl>
                                           <p:spTgt spid="3">
                                             <p:txEl>
-                                              <p:pRg st="3" end="3"/>
+                                              <p:pRg st="4" end="4"/>
                                             </p:txEl>
                                           </p:spTgt>
                                         </p:tgtEl>
@@ -29890,26 +29238,35 @@
                                   </p:childTnLst>
                                 </p:cTn>
                               </p:par>
-                            </p:childTnLst>
-                          </p:cTn>
-                        </p:par>
-                      </p:childTnLst>
-                    </p:cTn>
-                  </p:par>
-                  <p:par>
-                    <p:cTn id="15" fill="hold">
-                      <p:stCondLst>
-                        <p:cond delay="indefinite"/>
-                      </p:stCondLst>
-                      <p:childTnLst>
-                        <p:par>
-                          <p:cTn id="16" fill="hold">
-                            <p:stCondLst>
-                              <p:cond delay="0"/>
-                            </p:stCondLst>
-                            <p:childTnLst>
                               <p:par>
-                                <p:cTn id="17" presetID="1" presetClass="entr" presetSubtype="0" fill="hold" nodeType="clickEffect">
+                                <p:cTn id="15" presetID="1" presetClass="entr" presetSubtype="0" fill="hold" nodeType="withEffect">
+                                  <p:stCondLst>
+                                    <p:cond delay="0"/>
+                                  </p:stCondLst>
+                                  <p:childTnLst>
+                                    <p:set>
+                                      <p:cBhvr>
+                                        <p:cTn id="16" dur="1" fill="hold">
+                                          <p:stCondLst>
+                                            <p:cond delay="0"/>
+                                          </p:stCondLst>
+                                        </p:cTn>
+                                        <p:tgtEl>
+                                          <p:spTgt spid="5"/>
+                                        </p:tgtEl>
+                                        <p:attrNameLst>
+                                          <p:attrName>style.visibility</p:attrName>
+                                        </p:attrNameLst>
+                                      </p:cBhvr>
+                                      <p:to>
+                                        <p:strVal val="visible"/>
+                                      </p:to>
+                                    </p:set>
+                                  </p:childTnLst>
+                                </p:cTn>
+                              </p:par>
+                              <p:par>
+                                <p:cTn id="17" presetID="1" presetClass="entr" presetSubtype="0" fill="hold" grpId="0" nodeType="withEffect">
                                   <p:stCondLst>
                                     <p:cond delay="0"/>
                                   </p:stCondLst>
@@ -29922,11 +29279,7 @@
                                           </p:stCondLst>
                                         </p:cTn>
                                         <p:tgtEl>
-                                          <p:spTgt spid="3">
-                                            <p:txEl>
-                                              <p:pRg st="4" end="4"/>
-                                            </p:txEl>
-                                          </p:spTgt>
+                                          <p:spTgt spid="7"/>
                                         </p:tgtEl>
                                         <p:attrNameLst>
                                           <p:attrName>style.visibility</p:attrName>
@@ -29953,7 +29306,7 @@
                                           </p:stCondLst>
                                         </p:cTn>
                                         <p:tgtEl>
-                                          <p:spTgt spid="5"/>
+                                          <p:spTgt spid="11"/>
                                         </p:tgtEl>
                                         <p:attrNameLst>
                                           <p:attrName>style.visibility</p:attrName>
@@ -29980,7 +29333,7 @@
                                           </p:stCondLst>
                                         </p:cTn>
                                         <p:tgtEl>
-                                          <p:spTgt spid="7"/>
+                                          <p:spTgt spid="12"/>
                                         </p:tgtEl>
                                         <p:attrNameLst>
                                           <p:attrName>style.visibility</p:attrName>
@@ -30007,7 +29360,7 @@
                                           </p:stCondLst>
                                         </p:cTn>
                                         <p:tgtEl>
-                                          <p:spTgt spid="11"/>
+                                          <p:spTgt spid="2050"/>
                                         </p:tgtEl>
                                         <p:attrNameLst>
                                           <p:attrName>style.visibility</p:attrName>
@@ -30021,7 +29374,7 @@
                                 </p:cTn>
                               </p:par>
                               <p:par>
-                                <p:cTn id="25" presetID="1" presetClass="entr" presetSubtype="0" fill="hold" grpId="0" nodeType="withEffect">
+                                <p:cTn id="25" presetID="1" presetClass="entr" presetSubtype="0" fill="hold" nodeType="withEffect">
                                   <p:stCondLst>
                                     <p:cond delay="0"/>
                                   </p:stCondLst>
@@ -30034,7 +29387,7 @@
                                           </p:stCondLst>
                                         </p:cTn>
                                         <p:tgtEl>
-                                          <p:spTgt spid="12"/>
+                                          <p:spTgt spid="8"/>
                                         </p:tgtEl>
                                         <p:attrNameLst>
                                           <p:attrName>style.visibility</p:attrName>
@@ -30048,7 +29401,7 @@
                                 </p:cTn>
                               </p:par>
                               <p:par>
-                                <p:cTn id="27" presetID="1" presetClass="entr" presetSubtype="0" fill="hold" nodeType="withEffect">
+                                <p:cTn id="27" presetID="1" presetClass="entr" presetSubtype="0" fill="hold" grpId="0" nodeType="withEffect">
                                   <p:stCondLst>
                                     <p:cond delay="0"/>
                                   </p:stCondLst>
@@ -30061,7 +29414,7 @@
                                           </p:stCondLst>
                                         </p:cTn>
                                         <p:tgtEl>
-                                          <p:spTgt spid="2050"/>
+                                          <p:spTgt spid="9"/>
                                         </p:tgtEl>
                                         <p:attrNameLst>
                                           <p:attrName>style.visibility</p:attrName>
@@ -30083,60 +29436,6 @@
                                     <p:set>
                                       <p:cBhvr>
                                         <p:cTn id="30" dur="1" fill="hold">
-                                          <p:stCondLst>
-                                            <p:cond delay="0"/>
-                                          </p:stCondLst>
-                                        </p:cTn>
-                                        <p:tgtEl>
-                                          <p:spTgt spid="8"/>
-                                        </p:tgtEl>
-                                        <p:attrNameLst>
-                                          <p:attrName>style.visibility</p:attrName>
-                                        </p:attrNameLst>
-                                      </p:cBhvr>
-                                      <p:to>
-                                        <p:strVal val="visible"/>
-                                      </p:to>
-                                    </p:set>
-                                  </p:childTnLst>
-                                </p:cTn>
-                              </p:par>
-                              <p:par>
-                                <p:cTn id="31" presetID="1" presetClass="entr" presetSubtype="0" fill="hold" grpId="0" nodeType="withEffect">
-                                  <p:stCondLst>
-                                    <p:cond delay="0"/>
-                                  </p:stCondLst>
-                                  <p:childTnLst>
-                                    <p:set>
-                                      <p:cBhvr>
-                                        <p:cTn id="32" dur="1" fill="hold">
-                                          <p:stCondLst>
-                                            <p:cond delay="0"/>
-                                          </p:stCondLst>
-                                        </p:cTn>
-                                        <p:tgtEl>
-                                          <p:spTgt spid="9"/>
-                                        </p:tgtEl>
-                                        <p:attrNameLst>
-                                          <p:attrName>style.visibility</p:attrName>
-                                        </p:attrNameLst>
-                                      </p:cBhvr>
-                                      <p:to>
-                                        <p:strVal val="visible"/>
-                                      </p:to>
-                                    </p:set>
-                                  </p:childTnLst>
-                                </p:cTn>
-                              </p:par>
-                              <p:par>
-                                <p:cTn id="33" presetID="1" presetClass="entr" presetSubtype="0" fill="hold" nodeType="withEffect">
-                                  <p:stCondLst>
-                                    <p:cond delay="0"/>
-                                  </p:stCondLst>
-                                  <p:childTnLst>
-                                    <p:set>
-                                      <p:cBhvr>
-                                        <p:cTn id="34" dur="1" fill="hold">
                                           <p:stCondLst>
                                             <p:cond delay="0"/>
                                           </p:stCondLst>
@@ -30431,7 +29730,19 @@
                   <a:schemeClr val="bg1"/>
                 </a:solidFill>
               </a:rPr>
-              <a:t> на базата на сравнение </a:t>
+              <a:t> </a:t>
+            </a:r>
+            <a:r>
+              <a:rPr lang="ru-RU" dirty="0"/>
+              <a:t>на </a:t>
+            </a:r>
+            <a:r>
+              <a:rPr lang="ru-RU" b="1" dirty="0">
+                <a:solidFill>
+                  <a:schemeClr val="bg1"/>
+                </a:solidFill>
+              </a:rPr>
+              <a:t>базата на сравнение </a:t>
             </a:r>
             <a:r>
               <a:rPr lang="en-US" dirty="0"/>
@@ -30549,7 +29860,7 @@
                                         <p:tgtEl>
                                           <p:spTgt spid="3">
                                             <p:txEl>
-                                              <p:pRg st="1" end="1"/>
+                                              <p:pRg st="2" end="2"/>
                                             </p:txEl>
                                           </p:spTgt>
                                         </p:tgtEl>
@@ -30598,7 +29909,7 @@
                                         <p:tgtEl>
                                           <p:spTgt spid="3">
                                             <p:txEl>
-                                              <p:pRg st="2" end="2"/>
+                                              <p:pRg st="3" end="3"/>
                                             </p:txEl>
                                           </p:spTgt>
                                         </p:tgtEl>
@@ -30647,7 +29958,7 @@
                                         <p:tgtEl>
                                           <p:spTgt spid="3">
                                             <p:txEl>
-                                              <p:pRg st="3" end="3"/>
+                                              <p:pRg st="4" end="4"/>
                                             </p:txEl>
                                           </p:spTgt>
                                         </p:tgtEl>
@@ -30689,55 +30000,6 @@
                                     <p:set>
                                       <p:cBhvr>
                                         <p:cTn id="18" dur="1" fill="hold">
-                                          <p:stCondLst>
-                                            <p:cond delay="0"/>
-                                          </p:stCondLst>
-                                        </p:cTn>
-                                        <p:tgtEl>
-                                          <p:spTgt spid="3">
-                                            <p:txEl>
-                                              <p:pRg st="4" end="4"/>
-                                            </p:txEl>
-                                          </p:spTgt>
-                                        </p:tgtEl>
-                                        <p:attrNameLst>
-                                          <p:attrName>style.visibility</p:attrName>
-                                        </p:attrNameLst>
-                                      </p:cBhvr>
-                                      <p:to>
-                                        <p:strVal val="visible"/>
-                                      </p:to>
-                                    </p:set>
-                                  </p:childTnLst>
-                                </p:cTn>
-                              </p:par>
-                            </p:childTnLst>
-                          </p:cTn>
-                        </p:par>
-                      </p:childTnLst>
-                    </p:cTn>
-                  </p:par>
-                  <p:par>
-                    <p:cTn id="19" fill="hold">
-                      <p:stCondLst>
-                        <p:cond delay="indefinite"/>
-                      </p:stCondLst>
-                      <p:childTnLst>
-                        <p:par>
-                          <p:cTn id="20" fill="hold">
-                            <p:stCondLst>
-                              <p:cond delay="0"/>
-                            </p:stCondLst>
-                            <p:childTnLst>
-                              <p:par>
-                                <p:cTn id="21" presetID="1" presetClass="entr" presetSubtype="0" fill="hold" nodeType="clickEffect">
-                                  <p:stCondLst>
-                                    <p:cond delay="0"/>
-                                  </p:stCondLst>
-                                  <p:childTnLst>
-                                    <p:set>
-                                      <p:cBhvr>
-                                        <p:cTn id="22" dur="1" fill="hold">
                                           <p:stCondLst>
                                             <p:cond delay="0"/>
                                           </p:stCondLst>
@@ -31158,55 +30420,6 @@
                                         <p:tgtEl>
                                           <p:spTgt spid="3">
                                             <p:txEl>
-                                              <p:pRg st="1" end="1"/>
-                                            </p:txEl>
-                                          </p:spTgt>
-                                        </p:tgtEl>
-                                        <p:attrNameLst>
-                                          <p:attrName>style.visibility</p:attrName>
-                                        </p:attrNameLst>
-                                      </p:cBhvr>
-                                      <p:to>
-                                        <p:strVal val="visible"/>
-                                      </p:to>
-                                    </p:set>
-                                  </p:childTnLst>
-                                </p:cTn>
-                              </p:par>
-                            </p:childTnLst>
-                          </p:cTn>
-                        </p:par>
-                      </p:childTnLst>
-                    </p:cTn>
-                  </p:par>
-                  <p:par>
-                    <p:cTn id="7" fill="hold">
-                      <p:stCondLst>
-                        <p:cond delay="indefinite"/>
-                      </p:stCondLst>
-                      <p:childTnLst>
-                        <p:par>
-                          <p:cTn id="8" fill="hold">
-                            <p:stCondLst>
-                              <p:cond delay="0"/>
-                            </p:stCondLst>
-                            <p:childTnLst>
-                              <p:par>
-                                <p:cTn id="9" presetID="1" presetClass="entr" presetSubtype="0" fill="hold" nodeType="clickEffect">
-                                  <p:stCondLst>
-                                    <p:cond delay="0"/>
-                                  </p:stCondLst>
-                                  <p:childTnLst>
-                                    <p:set>
-                                      <p:cBhvr>
-                                        <p:cTn id="10" dur="1" fill="hold">
-                                          <p:stCondLst>
-                                            <p:cond delay="0"/>
-                                          </p:stCondLst>
-                                        </p:cTn>
-                                        <p:tgtEl>
-                                          <p:spTgt spid="3">
-                                            <p:txEl>
                                               <p:pRg st="2" end="2"/>
                                             </p:txEl>
                                           </p:spTgt>
@@ -31222,33 +30435,15 @@
                                   </p:childTnLst>
                                 </p:cTn>
                               </p:par>
-                            </p:childTnLst>
-                          </p:cTn>
-                        </p:par>
-                      </p:childTnLst>
-                    </p:cTn>
-                  </p:par>
-                  <p:par>
-                    <p:cTn id="11" fill="hold">
-                      <p:stCondLst>
-                        <p:cond delay="indefinite"/>
-                      </p:stCondLst>
-                      <p:childTnLst>
-                        <p:par>
-                          <p:cTn id="12" fill="hold">
-                            <p:stCondLst>
-                              <p:cond delay="0"/>
-                            </p:stCondLst>
-                            <p:childTnLst>
                               <p:par>
-                                <p:cTn id="13" presetID="1" presetClass="entr" presetSubtype="0" fill="hold" nodeType="clickEffect">
+                                <p:cTn id="7" presetID="1" presetClass="entr" presetSubtype="0" fill="hold" nodeType="withEffect">
                                   <p:stCondLst>
                                     <p:cond delay="0"/>
                                   </p:stCondLst>
                                   <p:childTnLst>
                                     <p:set>
                                       <p:cBhvr>
-                                        <p:cTn id="14" dur="1" fill="hold">
+                                        <p:cTn id="8" dur="1" fill="hold">
                                           <p:stCondLst>
                                             <p:cond delay="0"/>
                                           </p:stCondLst>
@@ -31278,26 +30473,26 @@
                     </p:cTn>
                   </p:par>
                   <p:par>
-                    <p:cTn id="15" fill="hold">
+                    <p:cTn id="9" fill="hold">
                       <p:stCondLst>
                         <p:cond delay="indefinite"/>
                       </p:stCondLst>
                       <p:childTnLst>
                         <p:par>
-                          <p:cTn id="16" fill="hold">
+                          <p:cTn id="10" fill="hold">
                             <p:stCondLst>
                               <p:cond delay="0"/>
                             </p:stCondLst>
                             <p:childTnLst>
                               <p:par>
-                                <p:cTn id="17" presetID="1" presetClass="entr" presetSubtype="0" fill="hold" nodeType="clickEffect">
+                                <p:cTn id="11" presetID="1" presetClass="entr" presetSubtype="0" fill="hold" nodeType="clickEffect">
                                   <p:stCondLst>
                                     <p:cond delay="0"/>
                                   </p:stCondLst>
                                   <p:childTnLst>
                                     <p:set>
                                       <p:cBhvr>
-                                        <p:cTn id="18" dur="1" fill="hold">
+                                        <p:cTn id="12" dur="1" fill="hold">
                                           <p:stCondLst>
                                             <p:cond delay="0"/>
                                           </p:stCondLst>
@@ -31621,7 +30816,19 @@
             </a:r>
             <a:r>
               <a:rPr lang="bg-BG" sz="3599" dirty="0"/>
-              <a:t>но неефективен алгоритъм</a:t>
+              <a:t>но </a:t>
+            </a:r>
+            <a:r>
+              <a:rPr lang="bg-BG" sz="3599" b="1" dirty="0">
+                <a:solidFill>
+                  <a:schemeClr val="bg1"/>
+                </a:solidFill>
+              </a:rPr>
+              <a:t>неефективен</a:t>
+            </a:r>
+            <a:r>
+              <a:rPr lang="bg-BG" sz="3599" dirty="0"/>
+              <a:t> алгоритъм</a:t>
             </a:r>
             <a:endParaRPr lang="en-US" sz="3599" dirty="0"/>
           </a:p>
@@ -31783,10 +30990,18 @@
               <a:t>: </a:t>
             </a:r>
             <a:r>
-              <a:rPr lang="bg-BG" sz="3199" dirty="0"/>
+              <a:rPr lang="bg-BG" sz="3199" b="1" dirty="0">
+                <a:solidFill>
+                  <a:schemeClr val="bg1"/>
+                </a:solidFill>
+              </a:rPr>
               <a:t>Избиране</a:t>
             </a:r>
-            <a:endParaRPr lang="en-US" sz="3199" dirty="0"/>
+            <a:endParaRPr lang="en-US" sz="3199" b="1" dirty="0">
+              <a:solidFill>
+                <a:schemeClr val="bg1"/>
+              </a:solidFill>
+            </a:endParaRPr>
           </a:p>
           <a:p>
             <a:pPr lvl="1">
@@ -31878,7 +31093,7 @@
           <a:p>
             <a:r>
               <a:rPr lang="en-US" dirty="0"/>
-              <a:t>Selection</a:t>
+              <a:t>Selection Sort</a:t>
             </a:r>
           </a:p>
         </p:txBody>
@@ -32263,7 +31478,7 @@
                                         <p:tgtEl>
                                           <p:spTgt spid="5">
                                             <p:txEl>
-                                              <p:pRg st="1" end="1"/>
+                                              <p:pRg st="2" end="2"/>
                                             </p:txEl>
                                           </p:spTgt>
                                         </p:tgtEl>
@@ -32312,7 +31527,7 @@
                                         <p:tgtEl>
                                           <p:spTgt spid="5">
                                             <p:txEl>
-                                              <p:pRg st="2" end="2"/>
+                                              <p:pRg st="3" end="3"/>
                                             </p:txEl>
                                           </p:spTgt>
                                         </p:tgtEl>
@@ -32361,55 +31576,6 @@
                                         <p:tgtEl>
                                           <p:spTgt spid="5">
                                             <p:txEl>
-                                              <p:pRg st="3" end="3"/>
-                                            </p:txEl>
-                                          </p:spTgt>
-                                        </p:tgtEl>
-                                        <p:attrNameLst>
-                                          <p:attrName>style.visibility</p:attrName>
-                                        </p:attrNameLst>
-                                      </p:cBhvr>
-                                      <p:to>
-                                        <p:strVal val="visible"/>
-                                      </p:to>
-                                    </p:set>
-                                  </p:childTnLst>
-                                </p:cTn>
-                              </p:par>
-                            </p:childTnLst>
-                          </p:cTn>
-                        </p:par>
-                      </p:childTnLst>
-                    </p:cTn>
-                  </p:par>
-                  <p:par>
-                    <p:cTn id="15" fill="hold">
-                      <p:stCondLst>
-                        <p:cond delay="indefinite"/>
-                      </p:stCondLst>
-                      <p:childTnLst>
-                        <p:par>
-                          <p:cTn id="16" fill="hold">
-                            <p:stCondLst>
-                              <p:cond delay="0"/>
-                            </p:stCondLst>
-                            <p:childTnLst>
-                              <p:par>
-                                <p:cTn id="17" presetID="1" presetClass="entr" presetSubtype="0" fill="hold" nodeType="clickEffect">
-                                  <p:stCondLst>
-                                    <p:cond delay="0"/>
-                                  </p:stCondLst>
-                                  <p:childTnLst>
-                                    <p:set>
-                                      <p:cBhvr>
-                                        <p:cTn id="18" dur="1" fill="hold">
-                                          <p:stCondLst>
-                                            <p:cond delay="0"/>
-                                          </p:stCondLst>
-                                        </p:cTn>
-                                        <p:tgtEl>
-                                          <p:spTgt spid="5">
-                                            <p:txEl>
                                               <p:pRg st="4" end="4"/>
                                             </p:txEl>
                                           </p:spTgt>
@@ -32426,19 +31592,19 @@
                                 </p:cTn>
                               </p:par>
                               <p:par>
-                                <p:cTn id="19" presetID="1" presetClass="entr" presetSubtype="0" fill="hold" nodeType="withEffect" nodePh="1">
+                                <p:cTn id="15" presetID="1" presetClass="entr" presetSubtype="0" fill="hold" nodeType="withEffect" nodePh="1">
                                   <p:stCondLst>
                                     <p:cond delay="0"/>
                                   </p:stCondLst>
                                   <p:endCondLst>
                                     <p:cond evt="begin" delay="0">
-                                      <p:tn val="19"/>
+                                      <p:tn val="15"/>
                                     </p:cond>
                                   </p:endCondLst>
                                   <p:childTnLst>
                                     <p:set>
                                       <p:cBhvr>
-                                        <p:cTn id="20" dur="1" fill="hold">
+                                        <p:cTn id="16" dur="1" fill="hold">
                                           <p:stCondLst>
                                             <p:cond delay="0"/>
                                           </p:stCondLst>
@@ -32462,14 +31628,14 @@
                                 </p:cTn>
                               </p:par>
                               <p:par>
-                                <p:cTn id="21" presetID="1" presetClass="entr" presetSubtype="0" fill="hold" nodeType="withEffect">
+                                <p:cTn id="17" presetID="1" presetClass="entr" presetSubtype="0" fill="hold" nodeType="withEffect">
                                   <p:stCondLst>
                                     <p:cond delay="0"/>
                                   </p:stCondLst>
                                   <p:childTnLst>
                                     <p:set>
                                       <p:cBhvr>
-                                        <p:cTn id="22" dur="1" fill="hold">
+                                        <p:cTn id="18" dur="1" fill="hold">
                                           <p:stCondLst>
                                             <p:cond delay="0"/>
                                           </p:stCondLst>
@@ -32495,26 +31661,26 @@
                     </p:cTn>
                   </p:par>
                   <p:par>
-                    <p:cTn id="23" fill="hold">
+                    <p:cTn id="19" fill="hold">
                       <p:stCondLst>
                         <p:cond delay="indefinite"/>
                       </p:stCondLst>
                       <p:childTnLst>
                         <p:par>
-                          <p:cTn id="24" fill="hold">
+                          <p:cTn id="20" fill="hold">
                             <p:stCondLst>
                               <p:cond delay="0"/>
                             </p:stCondLst>
                             <p:childTnLst>
                               <p:par>
-                                <p:cTn id="25" presetID="1" presetClass="entr" presetSubtype="0" fill="hold" grpId="0" nodeType="clickEffect">
+                                <p:cTn id="21" presetID="1" presetClass="entr" presetSubtype="0" fill="hold" grpId="0" nodeType="clickEffect">
                                   <p:stCondLst>
                                     <p:cond delay="0"/>
                                   </p:stCondLst>
                                   <p:childTnLst>
                                     <p:set>
                                       <p:cBhvr>
-                                        <p:cTn id="26" dur="1" fill="hold">
+                                        <p:cTn id="22" dur="1" fill="hold">
                                           <p:stCondLst>
                                             <p:cond delay="0"/>
                                           </p:stCondLst>
@@ -32534,14 +31700,14 @@
                                 </p:cTn>
                               </p:par>
                               <p:par>
-                                <p:cTn id="27" presetID="1" presetClass="entr" presetSubtype="0" fill="hold" nodeType="withEffect">
+                                <p:cTn id="23" presetID="1" presetClass="entr" presetSubtype="0" fill="hold" nodeType="withEffect">
                                   <p:stCondLst>
                                     <p:cond delay="0"/>
                                   </p:stCondLst>
                                   <p:childTnLst>
                                     <p:set>
                                       <p:cBhvr>
-                                        <p:cTn id="28" dur="1" fill="hold">
+                                        <p:cTn id="24" dur="1" fill="hold">
                                           <p:stCondLst>
                                             <p:cond delay="0"/>
                                           </p:stCondLst>
@@ -32915,13 +32081,35 @@
                   <a:schemeClr val="accent2"/>
                 </a:solidFill>
               </a:rPr>
-              <a:t> зададена на сегашния индекс от масива</a:t>
-            </a:r>
-            <a:r>
-              <a:rPr lang="en-GB" sz="2199" dirty="0">
+              <a:t> зададена на сегашния индекс от масив</a:t>
+            </a:r>
+            <a:endParaRPr lang="en-US" sz="2199" dirty="0">
+              <a:solidFill>
+                <a:schemeClr val="accent2"/>
+              </a:solidFill>
+            </a:endParaRPr>
+          </a:p>
+          <a:p>
+            <a:pPr>
+              <a:lnSpc>
+                <a:spcPct val="95000"/>
+              </a:lnSpc>
+            </a:pPr>
+            <a:r>
+              <a:rPr lang="en-US" sz="2199" dirty="0">
                 <a:solidFill>
                   <a:schemeClr val="accent2"/>
                 </a:solidFill>
+              </a:rPr>
+              <a:t>	 </a:t>
+            </a:r>
+            <a:r>
+              <a:rPr lang="en-US" sz="2199" dirty="0">
+                <a:solidFill>
+                  <a:schemeClr val="accent2"/>
+                </a:solidFill>
+                <a:latin typeface="Calibri" panose="020F0502020204030204" pitchFamily="34" charset="0"/>
+                <a:cs typeface="Calibri" panose="020F0502020204030204" pitchFamily="34" charset="0"/>
               </a:rPr>
               <a:t> </a:t>
             </a:r>
@@ -33235,11 +32423,11 @@
           <a:p>
             <a:r>
               <a:rPr lang="en-US" dirty="0"/>
-              <a:t>Selection: </a:t>
+              <a:t>Selection – K</a:t>
             </a:r>
             <a:r>
               <a:rPr lang="bg-BG" dirty="0"/>
-              <a:t>код</a:t>
+              <a:t>од</a:t>
             </a:r>
             <a:endParaRPr lang="en-US" dirty="0"/>
           </a:p>
@@ -33575,7 +32763,7 @@
                                         <p:tgtEl>
                                           <p:spTgt spid="11">
                                             <p:txEl>
-                                              <p:pRg st="14" end="14"/>
+                                              <p:pRg st="15" end="15"/>
                                             </p:txEl>
                                           </p:spTgt>
                                         </p:tgtEl>
@@ -33673,7 +32861,7 @@
                                         <p:tgtEl>
                                           <p:spTgt spid="11">
                                             <p:txEl>
-                                              <p:pRg st="6" end="6"/>
+                                              <p:pRg st="5" end="5"/>
                                             </p:txEl>
                                           </p:spTgt>
                                         </p:tgtEl>
@@ -33688,15 +32876,33 @@
                                   </p:childTnLst>
                                 </p:cTn>
                               </p:par>
+                            </p:childTnLst>
+                          </p:cTn>
+                        </p:par>
+                      </p:childTnLst>
+                    </p:cTn>
+                  </p:par>
+                  <p:par>
+                    <p:cTn id="23" fill="hold">
+                      <p:stCondLst>
+                        <p:cond delay="indefinite"/>
+                      </p:stCondLst>
+                      <p:childTnLst>
+                        <p:par>
+                          <p:cTn id="24" fill="hold">
+                            <p:stCondLst>
+                              <p:cond delay="0"/>
+                            </p:stCondLst>
+                            <p:childTnLst>
                               <p:par>
-                                <p:cTn id="23" presetID="1" presetClass="entr" presetSubtype="0" fill="hold" nodeType="withEffect">
+                                <p:cTn id="25" presetID="1" presetClass="entr" presetSubtype="0" fill="hold" nodeType="clickEffect">
                                   <p:stCondLst>
                                     <p:cond delay="0"/>
                                   </p:stCondLst>
                                   <p:childTnLst>
                                     <p:set>
                                       <p:cBhvr>
-                                        <p:cTn id="24" dur="1" fill="hold">
+                                        <p:cTn id="26" dur="1" fill="hold">
                                           <p:stCondLst>
                                             <p:cond delay="0"/>
                                           </p:stCondLst>
@@ -33720,14 +32926,14 @@
                                 </p:cTn>
                               </p:par>
                               <p:par>
-                                <p:cTn id="25" presetID="1" presetClass="entr" presetSubtype="0" fill="hold" nodeType="withEffect">
+                                <p:cTn id="27" presetID="1" presetClass="entr" presetSubtype="0" fill="hold" nodeType="withEffect">
                                   <p:stCondLst>
                                     <p:cond delay="0"/>
                                   </p:stCondLst>
                                   <p:childTnLst>
                                     <p:set>
                                       <p:cBhvr>
-                                        <p:cTn id="26" dur="1" fill="hold">
+                                        <p:cTn id="28" dur="1" fill="hold">
                                           <p:stCondLst>
                                             <p:cond delay="0"/>
                                           </p:stCondLst>
@@ -33750,26 +32956,8 @@
                                   </p:childTnLst>
                                 </p:cTn>
                               </p:par>
-                            </p:childTnLst>
-                          </p:cTn>
-                        </p:par>
-                      </p:childTnLst>
-                    </p:cTn>
-                  </p:par>
-                  <p:par>
-                    <p:cTn id="27" fill="hold">
-                      <p:stCondLst>
-                        <p:cond delay="indefinite"/>
-                      </p:stCondLst>
-                      <p:childTnLst>
-                        <p:par>
-                          <p:cTn id="28" fill="hold">
-                            <p:stCondLst>
-                              <p:cond delay="0"/>
-                            </p:stCondLst>
-                            <p:childTnLst>
                               <p:par>
-                                <p:cTn id="29" presetID="1" presetClass="entr" presetSubtype="0" fill="hold" nodeType="clickEffect">
+                                <p:cTn id="29" presetID="1" presetClass="entr" presetSubtype="0" fill="hold" nodeType="withEffect">
                                   <p:stCondLst>
                                     <p:cond delay="0"/>
                                   </p:stCondLst>
@@ -33784,7 +32972,7 @@
                                         <p:tgtEl>
                                           <p:spTgt spid="11">
                                             <p:txEl>
-                                              <p:pRg st="10" end="10"/>
+                                              <p:pRg st="9" end="9"/>
                                             </p:txEl>
                                           </p:spTgt>
                                         </p:tgtEl>
@@ -33799,39 +32987,26 @@
                                   </p:childTnLst>
                                 </p:cTn>
                               </p:par>
+                            </p:childTnLst>
+                          </p:cTn>
+                        </p:par>
+                      </p:childTnLst>
+                    </p:cTn>
+                  </p:par>
+                  <p:par>
+                    <p:cTn id="31" fill="hold">
+                      <p:stCondLst>
+                        <p:cond delay="indefinite"/>
+                      </p:stCondLst>
+                      <p:childTnLst>
+                        <p:par>
+                          <p:cTn id="32" fill="hold">
+                            <p:stCondLst>
+                              <p:cond delay="0"/>
+                            </p:stCondLst>
+                            <p:childTnLst>
                               <p:par>
-                                <p:cTn id="31" presetID="1" presetClass="entr" presetSubtype="0" fill="hold" nodeType="withEffect">
-                                  <p:stCondLst>
-                                    <p:cond delay="0"/>
-                                  </p:stCondLst>
-                                  <p:childTnLst>
-                                    <p:set>
-                                      <p:cBhvr>
-                                        <p:cTn id="32" dur="1" fill="hold">
-                                          <p:stCondLst>
-                                            <p:cond delay="0"/>
-                                          </p:stCondLst>
-                                        </p:cTn>
-                                        <p:tgtEl>
-                                          <p:spTgt spid="11">
-                                            <p:txEl>
-                                              <p:pRg st="11" end="11"/>
-                                            </p:txEl>
-                                          </p:spTgt>
-                                        </p:tgtEl>
-                                        <p:attrNameLst>
-                                          <p:attrName>style.visibility</p:attrName>
-                                        </p:attrNameLst>
-                                      </p:cBhvr>
-                                      <p:to>
-                                        <p:strVal val="visible"/>
-                                      </p:to>
-                                    </p:set>
-                                  </p:childTnLst>
-                                </p:cTn>
-                              </p:par>
-                              <p:par>
-                                <p:cTn id="33" presetID="1" presetClass="entr" presetSubtype="0" fill="hold" nodeType="withEffect">
+                                <p:cTn id="33" presetID="1" presetClass="entr" presetSubtype="0" fill="hold" nodeType="clickEffect">
                                   <p:stCondLst>
                                     <p:cond delay="0"/>
                                   </p:stCondLst>
@@ -33846,7 +33021,7 @@
                                         <p:tgtEl>
                                           <p:spTgt spid="11">
                                             <p:txEl>
-                                              <p:pRg st="12" end="12"/>
+                                              <p:pRg st="11" end="11"/>
                                             </p:txEl>
                                           </p:spTgt>
                                         </p:tgtEl>
@@ -33877,7 +33052,69 @@
                                         <p:tgtEl>
                                           <p:spTgt spid="11">
                                             <p:txEl>
+                                              <p:pRg st="12" end="12"/>
+                                            </p:txEl>
+                                          </p:spTgt>
+                                        </p:tgtEl>
+                                        <p:attrNameLst>
+                                          <p:attrName>style.visibility</p:attrName>
+                                        </p:attrNameLst>
+                                      </p:cBhvr>
+                                      <p:to>
+                                        <p:strVal val="visible"/>
+                                      </p:to>
+                                    </p:set>
+                                  </p:childTnLst>
+                                </p:cTn>
+                              </p:par>
+                              <p:par>
+                                <p:cTn id="37" presetID="1" presetClass="entr" presetSubtype="0" fill="hold" nodeType="withEffect">
+                                  <p:stCondLst>
+                                    <p:cond delay="0"/>
+                                  </p:stCondLst>
+                                  <p:childTnLst>
+                                    <p:set>
+                                      <p:cBhvr>
+                                        <p:cTn id="38" dur="1" fill="hold">
+                                          <p:stCondLst>
+                                            <p:cond delay="0"/>
+                                          </p:stCondLst>
+                                        </p:cTn>
+                                        <p:tgtEl>
+                                          <p:spTgt spid="11">
+                                            <p:txEl>
                                               <p:pRg st="13" end="13"/>
+                                            </p:txEl>
+                                          </p:spTgt>
+                                        </p:tgtEl>
+                                        <p:attrNameLst>
+                                          <p:attrName>style.visibility</p:attrName>
+                                        </p:attrNameLst>
+                                      </p:cBhvr>
+                                      <p:to>
+                                        <p:strVal val="visible"/>
+                                      </p:to>
+                                    </p:set>
+                                  </p:childTnLst>
+                                </p:cTn>
+                              </p:par>
+                              <p:par>
+                                <p:cTn id="39" presetID="1" presetClass="entr" presetSubtype="0" fill="hold" nodeType="withEffect">
+                                  <p:stCondLst>
+                                    <p:cond delay="0"/>
+                                  </p:stCondLst>
+                                  <p:childTnLst>
+                                    <p:set>
+                                      <p:cBhvr>
+                                        <p:cTn id="40" dur="1" fill="hold">
+                                          <p:stCondLst>
+                                            <p:cond delay="0"/>
+                                          </p:stCondLst>
+                                        </p:cTn>
+                                        <p:tgtEl>
+                                          <p:spTgt spid="11">
+                                            <p:txEl>
+                                              <p:pRg st="14" end="14"/>
                                             </p:txEl>
                                           </p:spTgt>
                                         </p:tgtEl>
@@ -33899,26 +33136,26 @@
                     </p:cTn>
                   </p:par>
                   <p:par>
-                    <p:cTn id="37" fill="hold">
+                    <p:cTn id="41" fill="hold">
                       <p:stCondLst>
                         <p:cond delay="indefinite"/>
                       </p:stCondLst>
                       <p:childTnLst>
                         <p:par>
-                          <p:cTn id="38" fill="hold">
+                          <p:cTn id="42" fill="hold">
                             <p:stCondLst>
                               <p:cond delay="0"/>
                             </p:stCondLst>
                             <p:childTnLst>
                               <p:par>
-                                <p:cTn id="39" presetID="1" presetClass="entr" presetSubtype="0" fill="hold" nodeType="clickEffect">
+                                <p:cTn id="43" presetID="1" presetClass="entr" presetSubtype="0" fill="hold" nodeType="clickEffect">
                                   <p:stCondLst>
                                     <p:cond delay="0"/>
                                   </p:stCondLst>
                                   <p:childTnLst>
                                     <p:set>
                                       <p:cBhvr>
-                                        <p:cTn id="40" dur="1" fill="hold">
+                                        <p:cTn id="44" dur="1" fill="hold">
                                           <p:stCondLst>
                                             <p:cond delay="0"/>
                                           </p:stCondLst>
@@ -33926,7 +33163,7 @@
                                         <p:tgtEl>
                                           <p:spTgt spid="11">
                                             <p:txEl>
-                                              <p:pRg st="16" end="16"/>
+                                              <p:pRg st="17" end="17"/>
                                             </p:txEl>
                                           </p:spTgt>
                                         </p:tgtEl>

</xml_diff>